<commit_message>
feat: add example of themeprovider change
</commit_message>
<xml_diff>
--- a/Resources/Presentation/Obrigada.pptx
+++ b/Resources/Presentation/Obrigada.pptx
@@ -5,23 +5,23 @@
     <p:sldMasterId id="2147483648" r:id="rId1"/>
   </p:sldMasterIdLst>
   <p:sldIdLst>
-    <p:sldId id="256" r:id="rId20"/>
-    <p:sldId id="257" r:id="rId21"/>
-    <p:sldId id="258" r:id="rId22"/>
-    <p:sldId id="259" r:id="rId23"/>
-    <p:sldId id="260" r:id="rId24"/>
-    <p:sldId id="261" r:id="rId25"/>
-    <p:sldId id="262" r:id="rId26"/>
-    <p:sldId id="263" r:id="rId27"/>
-    <p:sldId id="264" r:id="rId28"/>
-    <p:sldId id="265" r:id="rId29"/>
-    <p:sldId id="266" r:id="rId30"/>
-    <p:sldId id="267" r:id="rId31"/>
-    <p:sldId id="268" r:id="rId32"/>
-    <p:sldId id="269" r:id="rId33"/>
-    <p:sldId id="270" r:id="rId34"/>
-    <p:sldId id="271" r:id="rId35"/>
-    <p:sldId id="272" r:id="rId36"/>
+    <p:sldId id="256" r:id="rId18"/>
+    <p:sldId id="257" r:id="rId19"/>
+    <p:sldId id="258" r:id="rId20"/>
+    <p:sldId id="259" r:id="rId21"/>
+    <p:sldId id="260" r:id="rId22"/>
+    <p:sldId id="261" r:id="rId23"/>
+    <p:sldId id="262" r:id="rId24"/>
+    <p:sldId id="263" r:id="rId25"/>
+    <p:sldId id="264" r:id="rId26"/>
+    <p:sldId id="265" r:id="rId27"/>
+    <p:sldId id="266" r:id="rId28"/>
+    <p:sldId id="267" r:id="rId29"/>
+    <p:sldId id="268" r:id="rId30"/>
+    <p:sldId id="269" r:id="rId31"/>
+    <p:sldId id="270" r:id="rId32"/>
+    <p:sldId id="271" r:id="rId33"/>
+    <p:sldId id="272" r:id="rId34"/>
   </p:sldIdLst>
   <p:sldSz cx="18288000" cy="10287000"/>
   <p:notesSz cx="6858000" cy="9144000"/>
@@ -51,36 +51,28 @@
       <p:regular r:id="rId11"/>
     </p:embeddedFont>
     <p:embeddedFont>
-      <p:font typeface="Open Sans Extra Bold" charset="1" panose="020B0906030804020204"/>
+      <p:font typeface="Inter" charset="1" panose="020B0502030000000004"/>
       <p:regular r:id="rId12"/>
     </p:embeddedFont>
     <p:embeddedFont>
-      <p:font typeface="Open Sans Extra Bold Italics" charset="1" panose="020B0906030804020204"/>
+      <p:font typeface="Inter Bold" charset="1" panose="020B0802030000000004"/>
       <p:regular r:id="rId13"/>
     </p:embeddedFont>
     <p:embeddedFont>
-      <p:font typeface="Inter" charset="1" panose="020B0502030000000004"/>
+      <p:font typeface="Inter Italics" charset="1" panose="020B0502030000000004"/>
       <p:regular r:id="rId14"/>
     </p:embeddedFont>
     <p:embeddedFont>
-      <p:font typeface="Inter Bold" charset="1" panose="020B0802030000000004"/>
+      <p:font typeface="Inter Bold Italics" charset="1" panose="020B0802030000000004"/>
       <p:regular r:id="rId15"/>
     </p:embeddedFont>
     <p:embeddedFont>
-      <p:font typeface="Inter Italics" charset="1" panose="020B0502030000000004"/>
+      <p:font typeface="Quicksand Light" charset="1" panose="00000400000000000000"/>
       <p:regular r:id="rId16"/>
     </p:embeddedFont>
     <p:embeddedFont>
-      <p:font typeface="Inter Bold Italics" charset="1" panose="020B0802030000000004"/>
+      <p:font typeface="Quicksand Light Bold" charset="1" panose="00000500000000000000"/>
       <p:regular r:id="rId17"/>
-    </p:embeddedFont>
-    <p:embeddedFont>
-      <p:font typeface="Quicksand Light" charset="1" panose="00000400000000000000"/>
-      <p:regular r:id="rId18"/>
-    </p:embeddedFont>
-    <p:embeddedFont>
-      <p:font typeface="Quicksand Light Bold" charset="1" panose="00000500000000000000"/>
-      <p:regular r:id="rId19"/>
     </p:embeddedFont>
   </p:embeddedFontLst>
   <p:defaultTextStyle>
@@ -7542,44 +7534,217 @@
           <a:chExt cx="0" cy="0"/>
         </a:xfrm>
       </p:grpSpPr>
-      <p:sp>
-        <p:nvSpPr>
-          <p:cNvPr name="TextBox 2" id="2"/>
-          <p:cNvSpPr txBox="true"/>
+      <p:grpSp>
+        <p:nvGrpSpPr>
+          <p:cNvPr name="Group 2" id="2"/>
+          <p:cNvGrpSpPr/>
           <p:nvPr/>
-        </p:nvSpPr>
-        <p:spPr>
+        </p:nvGrpSpPr>
+        <p:grpSpPr>
           <a:xfrm rot="0">
-            <a:off x="1732880" y="4295775"/>
-            <a:ext cx="14822239" cy="1533525"/>
+            <a:off x="9315853" y="7337631"/>
+            <a:ext cx="6216356" cy="6216356"/>
+            <a:chOff x="0" y="0"/>
+            <a:chExt cx="6350000" cy="6350000"/>
           </a:xfrm>
-          <a:prstGeom prst="rect">
-            <a:avLst/>
-          </a:prstGeom>
-        </p:spPr>
-        <p:txBody>
-          <a:bodyPr anchor="t" rtlCol="false" tIns="0" lIns="0" bIns="0" rIns="0">
-            <a:spAutoFit/>
-          </a:bodyPr>
-          <a:lstStyle/>
-          <a:p>
-            <a:pPr algn="ctr">
-              <a:lnSpc>
-                <a:spcPts val="12599"/>
-              </a:lnSpc>
-            </a:pPr>
-            <a:r>
-              <a:rPr lang="en-US" sz="9000">
-                <a:solidFill>
-                  <a:srgbClr val="000000"/>
-                </a:solidFill>
-                <a:latin typeface="Open Sans Extra Bold"/>
-              </a:rPr>
-              <a:t>incluir gif themeprovider</a:t>
-            </a:r>
-          </a:p>
-        </p:txBody>
-      </p:sp>
+        </p:grpSpPr>
+        <p:sp>
+          <p:nvSpPr>
+            <p:cNvPr name="Freeform 3" id="3"/>
+            <p:cNvSpPr/>
+            <p:nvPr/>
+          </p:nvSpPr>
+          <p:spPr>
+            <a:xfrm>
+              <a:off x="14167" y="0"/>
+              <a:ext cx="6321665" cy="6350000"/>
+            </a:xfrm>
+            <a:custGeom>
+              <a:avLst/>
+              <a:gdLst/>
+              <a:ahLst/>
+              <a:cxnLst/>
+              <a:rect r="r" b="b" t="t" l="l"/>
+              <a:pathLst>
+                <a:path h="6350000" w="6321665">
+                  <a:moveTo>
+                    <a:pt x="3160833" y="0"/>
+                  </a:moveTo>
+                  <a:lnTo>
+                    <a:pt x="3160833" y="0"/>
+                  </a:lnTo>
+                  <a:cubicBezTo>
+                    <a:pt x="4908795" y="7817"/>
+                    <a:pt x="6321666" y="1427021"/>
+                    <a:pt x="6321666" y="3175000"/>
+                  </a:cubicBezTo>
+                  <a:cubicBezTo>
+                    <a:pt x="6321666" y="4922979"/>
+                    <a:pt x="4908795" y="6342183"/>
+                    <a:pt x="3160833" y="6350000"/>
+                  </a:cubicBezTo>
+                  <a:cubicBezTo>
+                    <a:pt x="1412871" y="6342183"/>
+                    <a:pt x="0" y="4922979"/>
+                    <a:pt x="0" y="3175000"/>
+                  </a:cubicBezTo>
+                  <a:cubicBezTo>
+                    <a:pt x="0" y="1427021"/>
+                    <a:pt x="1412871" y="7817"/>
+                    <a:pt x="3160833" y="0"/>
+                  </a:cubicBezTo>
+                  <a:close/>
+                </a:path>
+              </a:pathLst>
+            </a:custGeom>
+            <a:solidFill>
+              <a:srgbClr val="242725">
+                <a:alpha val="4705"/>
+              </a:srgbClr>
+            </a:solidFill>
+          </p:spPr>
+        </p:sp>
+      </p:grpSp>
+      <p:grpSp>
+        <p:nvGrpSpPr>
+          <p:cNvPr name="Group 4" id="4"/>
+          <p:cNvGrpSpPr/>
+          <p:nvPr/>
+        </p:nvGrpSpPr>
+        <p:grpSpPr>
+          <a:xfrm rot="0">
+            <a:off x="15720609" y="8200652"/>
+            <a:ext cx="1538691" cy="1538691"/>
+            <a:chOff x="0" y="0"/>
+            <a:chExt cx="6350000" cy="6350000"/>
+          </a:xfrm>
+        </p:grpSpPr>
+        <p:sp>
+          <p:nvSpPr>
+            <p:cNvPr name="Freeform 5" id="5"/>
+            <p:cNvSpPr/>
+            <p:nvPr/>
+          </p:nvSpPr>
+          <p:spPr>
+            <a:xfrm>
+              <a:off x="14167" y="0"/>
+              <a:ext cx="6321665" cy="6350000"/>
+            </a:xfrm>
+            <a:custGeom>
+              <a:avLst/>
+              <a:gdLst/>
+              <a:ahLst/>
+              <a:cxnLst/>
+              <a:rect r="r" b="b" t="t" l="l"/>
+              <a:pathLst>
+                <a:path h="6350000" w="6321665">
+                  <a:moveTo>
+                    <a:pt x="3160833" y="0"/>
+                  </a:moveTo>
+                  <a:lnTo>
+                    <a:pt x="3160833" y="0"/>
+                  </a:lnTo>
+                  <a:cubicBezTo>
+                    <a:pt x="4908795" y="7817"/>
+                    <a:pt x="6321666" y="1427021"/>
+                    <a:pt x="6321666" y="3175000"/>
+                  </a:cubicBezTo>
+                  <a:cubicBezTo>
+                    <a:pt x="6321666" y="4922979"/>
+                    <a:pt x="4908795" y="6342183"/>
+                    <a:pt x="3160833" y="6350000"/>
+                  </a:cubicBezTo>
+                  <a:cubicBezTo>
+                    <a:pt x="1412871" y="6342183"/>
+                    <a:pt x="0" y="4922979"/>
+                    <a:pt x="0" y="3175000"/>
+                  </a:cubicBezTo>
+                  <a:cubicBezTo>
+                    <a:pt x="0" y="1427021"/>
+                    <a:pt x="1412871" y="7817"/>
+                    <a:pt x="3160833" y="0"/>
+                  </a:cubicBezTo>
+                  <a:close/>
+                </a:path>
+              </a:pathLst>
+            </a:custGeom>
+            <a:solidFill>
+              <a:srgbClr val="2ED47B"/>
+            </a:solidFill>
+          </p:spPr>
+        </p:sp>
+      </p:grpSp>
+      <p:grpSp>
+        <p:nvGrpSpPr>
+          <p:cNvPr name="Group 6" id="6"/>
+          <p:cNvGrpSpPr/>
+          <p:nvPr/>
+        </p:nvGrpSpPr>
+        <p:grpSpPr>
+          <a:xfrm rot="0">
+            <a:off x="16780498" y="8491196"/>
+            <a:ext cx="957604" cy="957604"/>
+            <a:chOff x="0" y="0"/>
+            <a:chExt cx="6350000" cy="6350000"/>
+          </a:xfrm>
+        </p:grpSpPr>
+        <p:sp>
+          <p:nvSpPr>
+            <p:cNvPr name="Freeform 7" id="7"/>
+            <p:cNvSpPr/>
+            <p:nvPr/>
+          </p:nvSpPr>
+          <p:spPr>
+            <a:xfrm>
+              <a:off x="14167" y="0"/>
+              <a:ext cx="6321665" cy="6350000"/>
+            </a:xfrm>
+            <a:custGeom>
+              <a:avLst/>
+              <a:gdLst/>
+              <a:ahLst/>
+              <a:cxnLst/>
+              <a:rect r="r" b="b" t="t" l="l"/>
+              <a:pathLst>
+                <a:path h="6350000" w="6321665">
+                  <a:moveTo>
+                    <a:pt x="3160833" y="0"/>
+                  </a:moveTo>
+                  <a:lnTo>
+                    <a:pt x="3160833" y="0"/>
+                  </a:lnTo>
+                  <a:cubicBezTo>
+                    <a:pt x="4908795" y="7817"/>
+                    <a:pt x="6321666" y="1427021"/>
+                    <a:pt x="6321666" y="3175000"/>
+                  </a:cubicBezTo>
+                  <a:cubicBezTo>
+                    <a:pt x="6321666" y="4922979"/>
+                    <a:pt x="4908795" y="6342183"/>
+                    <a:pt x="3160833" y="6350000"/>
+                  </a:cubicBezTo>
+                  <a:cubicBezTo>
+                    <a:pt x="1412871" y="6342183"/>
+                    <a:pt x="0" y="4922979"/>
+                    <a:pt x="0" y="3175000"/>
+                  </a:cubicBezTo>
+                  <a:cubicBezTo>
+                    <a:pt x="0" y="1427021"/>
+                    <a:pt x="1412871" y="7817"/>
+                    <a:pt x="3160833" y="0"/>
+                  </a:cubicBezTo>
+                  <a:close/>
+                </a:path>
+              </a:pathLst>
+            </a:custGeom>
+            <a:solidFill>
+              <a:srgbClr val="242725">
+                <a:alpha val="4705"/>
+              </a:srgbClr>
+            </a:solidFill>
+          </p:spPr>
+        </p:sp>
+      </p:grpSp>
     </p:spTree>
   </p:cSld>
   <p:clrMapOvr>
@@ -10358,9 +10523,1366 @@
           <a:chExt cx="0" cy="0"/>
         </a:xfrm>
       </p:grpSpPr>
+      <p:grpSp>
+        <p:nvGrpSpPr>
+          <p:cNvPr name="Group 2" id="2"/>
+          <p:cNvGrpSpPr/>
+          <p:nvPr/>
+        </p:nvGrpSpPr>
+        <p:grpSpPr>
+          <a:xfrm rot="0">
+            <a:off x="10211329" y="885314"/>
+            <a:ext cx="2912577" cy="2839113"/>
+            <a:chOff x="0" y="0"/>
+            <a:chExt cx="4589780" cy="4578350"/>
+          </a:xfrm>
+        </p:grpSpPr>
+        <p:sp>
+          <p:nvSpPr>
+            <p:cNvPr name="Freeform 3" id="3"/>
+            <p:cNvSpPr/>
+            <p:nvPr/>
+          </p:nvSpPr>
+          <p:spPr>
+            <a:xfrm>
+              <a:off x="232345" y="209944"/>
+              <a:ext cx="2418937" cy="2345148"/>
+            </a:xfrm>
+            <a:custGeom>
+              <a:avLst/>
+              <a:gdLst/>
+              <a:ahLst/>
+              <a:cxnLst/>
+              <a:rect r="r" b="b" t="t" l="l"/>
+              <a:pathLst>
+                <a:path h="2345148" w="2418937">
+                  <a:moveTo>
+                    <a:pt x="20688" y="139962"/>
+                  </a:moveTo>
+                  <a:lnTo>
+                    <a:pt x="20688" y="116635"/>
+                  </a:lnTo>
+                  <a:cubicBezTo>
+                    <a:pt x="46947" y="116635"/>
+                    <a:pt x="68431" y="95641"/>
+                    <a:pt x="68431" y="69981"/>
+                  </a:cubicBezTo>
+                  <a:cubicBezTo>
+                    <a:pt x="68431" y="44321"/>
+                    <a:pt x="46947" y="23327"/>
+                    <a:pt x="20688" y="23327"/>
+                  </a:cubicBezTo>
+                  <a:lnTo>
+                    <a:pt x="20688" y="0"/>
+                  </a:lnTo>
+                  <a:cubicBezTo>
+                    <a:pt x="60474" y="0"/>
+                    <a:pt x="92302" y="31102"/>
+                    <a:pt x="92302" y="69981"/>
+                  </a:cubicBezTo>
+                  <a:cubicBezTo>
+                    <a:pt x="92302" y="108859"/>
+                    <a:pt x="60474" y="139962"/>
+                    <a:pt x="20688" y="139962"/>
+                  </a:cubicBezTo>
+                  <a:close/>
+                  <a:moveTo>
+                    <a:pt x="1273125" y="80867"/>
+                  </a:moveTo>
+                  <a:lnTo>
+                    <a:pt x="1273125" y="57540"/>
+                  </a:lnTo>
+                  <a:lnTo>
+                    <a:pt x="1129898" y="57540"/>
+                  </a:lnTo>
+                  <a:lnTo>
+                    <a:pt x="1129898" y="80867"/>
+                  </a:lnTo>
+                  <a:lnTo>
+                    <a:pt x="1273125" y="80867"/>
+                  </a:lnTo>
+                  <a:close/>
+                  <a:moveTo>
+                    <a:pt x="1201511" y="2345148"/>
+                  </a:moveTo>
+                  <a:cubicBezTo>
+                    <a:pt x="1241297" y="2345148"/>
+                    <a:pt x="1273125" y="2314045"/>
+                    <a:pt x="1273125" y="2275167"/>
+                  </a:cubicBezTo>
+                  <a:lnTo>
+                    <a:pt x="1249254" y="2275167"/>
+                  </a:lnTo>
+                  <a:cubicBezTo>
+                    <a:pt x="1249254" y="2300827"/>
+                    <a:pt x="1227770" y="2321821"/>
+                    <a:pt x="1201511" y="2321821"/>
+                  </a:cubicBezTo>
+                  <a:cubicBezTo>
+                    <a:pt x="1175253" y="2321821"/>
+                    <a:pt x="1153769" y="2300827"/>
+                    <a:pt x="1153769" y="2275167"/>
+                  </a:cubicBezTo>
+                  <a:lnTo>
+                    <a:pt x="1129898" y="2275167"/>
+                  </a:lnTo>
+                  <a:cubicBezTo>
+                    <a:pt x="1129898" y="2313268"/>
+                    <a:pt x="1161726" y="2345148"/>
+                    <a:pt x="1201511" y="2345148"/>
+                  </a:cubicBezTo>
+                  <a:close/>
+                  <a:moveTo>
+                    <a:pt x="592799" y="1748753"/>
+                  </a:moveTo>
+                  <a:cubicBezTo>
+                    <a:pt x="592799" y="1787631"/>
+                    <a:pt x="624627" y="1818734"/>
+                    <a:pt x="664412" y="1818734"/>
+                  </a:cubicBezTo>
+                  <a:lnTo>
+                    <a:pt x="664412" y="1795407"/>
+                  </a:lnTo>
+                  <a:cubicBezTo>
+                    <a:pt x="638154" y="1795407"/>
+                    <a:pt x="616670" y="1774412"/>
+                    <a:pt x="616670" y="1748753"/>
+                  </a:cubicBezTo>
+                  <a:cubicBezTo>
+                    <a:pt x="616670" y="1723093"/>
+                    <a:pt x="638154" y="1702098"/>
+                    <a:pt x="664412" y="1702098"/>
+                  </a:cubicBezTo>
+                  <a:lnTo>
+                    <a:pt x="664412" y="1678771"/>
+                  </a:lnTo>
+                  <a:cubicBezTo>
+                    <a:pt x="625423" y="1678771"/>
+                    <a:pt x="592799" y="1710652"/>
+                    <a:pt x="592799" y="1748753"/>
+                  </a:cubicBezTo>
+                  <a:close/>
+                  <a:moveTo>
+                    <a:pt x="101054" y="1245665"/>
+                  </a:moveTo>
+                  <a:lnTo>
+                    <a:pt x="117764" y="1228559"/>
+                  </a:lnTo>
+                  <a:lnTo>
+                    <a:pt x="16710" y="1129808"/>
+                  </a:lnTo>
+                  <a:lnTo>
+                    <a:pt x="0" y="1146137"/>
+                  </a:lnTo>
+                  <a:lnTo>
+                    <a:pt x="101054" y="1245665"/>
+                  </a:lnTo>
+                  <a:close/>
+                  <a:moveTo>
+                    <a:pt x="2418937" y="644604"/>
+                  </a:moveTo>
+                  <a:lnTo>
+                    <a:pt x="2418937" y="621277"/>
+                  </a:lnTo>
+                  <a:lnTo>
+                    <a:pt x="2275710" y="621277"/>
+                  </a:lnTo>
+                  <a:lnTo>
+                    <a:pt x="2275710" y="644604"/>
+                  </a:lnTo>
+                  <a:lnTo>
+                    <a:pt x="2418937" y="644604"/>
+                  </a:lnTo>
+                  <a:close/>
+                  <a:moveTo>
+                    <a:pt x="2311517" y="1192013"/>
+                  </a:moveTo>
+                  <a:cubicBezTo>
+                    <a:pt x="2311517" y="1230892"/>
+                    <a:pt x="2343345" y="1261994"/>
+                    <a:pt x="2383130" y="1261994"/>
+                  </a:cubicBezTo>
+                  <a:lnTo>
+                    <a:pt x="2383130" y="1238667"/>
+                  </a:lnTo>
+                  <a:cubicBezTo>
+                    <a:pt x="2356872" y="1238667"/>
+                    <a:pt x="2335388" y="1217673"/>
+                    <a:pt x="2335388" y="1192013"/>
+                  </a:cubicBezTo>
+                  <a:cubicBezTo>
+                    <a:pt x="2335388" y="1166353"/>
+                    <a:pt x="2356872" y="1145359"/>
+                    <a:pt x="2383130" y="1145359"/>
+                  </a:cubicBezTo>
+                  <a:lnTo>
+                    <a:pt x="2383130" y="1122032"/>
+                  </a:lnTo>
+                  <a:cubicBezTo>
+                    <a:pt x="2344141" y="1122032"/>
+                    <a:pt x="2311517" y="1153135"/>
+                    <a:pt x="2311517" y="1192013"/>
+                  </a:cubicBezTo>
+                  <a:close/>
+                  <a:moveTo>
+                    <a:pt x="1235727" y="630608"/>
+                  </a:moveTo>
+                  <a:cubicBezTo>
+                    <a:pt x="1235727" y="591730"/>
+                    <a:pt x="1203899" y="560627"/>
+                    <a:pt x="1164113" y="560627"/>
+                  </a:cubicBezTo>
+                  <a:lnTo>
+                    <a:pt x="1164113" y="583954"/>
+                  </a:lnTo>
+                  <a:cubicBezTo>
+                    <a:pt x="1190372" y="583954"/>
+                    <a:pt x="1211856" y="604948"/>
+                    <a:pt x="1211856" y="630608"/>
+                  </a:cubicBezTo>
+                  <a:cubicBezTo>
+                    <a:pt x="1211856" y="656268"/>
+                    <a:pt x="1190372" y="677262"/>
+                    <a:pt x="1164113" y="677262"/>
+                  </a:cubicBezTo>
+                  <a:lnTo>
+                    <a:pt x="1164113" y="700589"/>
+                  </a:lnTo>
+                  <a:cubicBezTo>
+                    <a:pt x="1203899" y="700589"/>
+                    <a:pt x="1235727" y="668709"/>
+                    <a:pt x="1235727" y="630608"/>
+                  </a:cubicBezTo>
+                  <a:close/>
+                  <a:moveTo>
+                    <a:pt x="639745" y="559072"/>
+                  </a:moveTo>
+                  <a:lnTo>
+                    <a:pt x="615874" y="559072"/>
+                  </a:lnTo>
+                  <a:lnTo>
+                    <a:pt x="615874" y="699034"/>
+                  </a:lnTo>
+                  <a:lnTo>
+                    <a:pt x="639745" y="699034"/>
+                  </a:lnTo>
+                  <a:lnTo>
+                    <a:pt x="639745" y="559072"/>
+                  </a:lnTo>
+                  <a:close/>
+                  <a:moveTo>
+                    <a:pt x="1272329" y="1201344"/>
+                  </a:moveTo>
+                  <a:lnTo>
+                    <a:pt x="1272329" y="1178017"/>
+                  </a:lnTo>
+                  <a:lnTo>
+                    <a:pt x="1129103" y="1178017"/>
+                  </a:lnTo>
+                  <a:lnTo>
+                    <a:pt x="1129103" y="1201344"/>
+                  </a:lnTo>
+                  <a:lnTo>
+                    <a:pt x="1272329" y="1201344"/>
+                  </a:lnTo>
+                  <a:close/>
+                  <a:moveTo>
+                    <a:pt x="2418937" y="2320266"/>
+                  </a:moveTo>
+                  <a:lnTo>
+                    <a:pt x="2418937" y="2296939"/>
+                  </a:lnTo>
+                  <a:lnTo>
+                    <a:pt x="2275710" y="2296939"/>
+                  </a:lnTo>
+                  <a:lnTo>
+                    <a:pt x="2275710" y="2320266"/>
+                  </a:lnTo>
+                  <a:lnTo>
+                    <a:pt x="2418937" y="2320266"/>
+                  </a:lnTo>
+                  <a:close/>
+                </a:path>
+              </a:pathLst>
+            </a:custGeom>
+            <a:solidFill>
+              <a:srgbClr val="383838"/>
+            </a:solidFill>
+          </p:spPr>
+        </p:sp>
+        <p:sp>
+          <p:nvSpPr>
+            <p:cNvPr name="Freeform 4" id="4"/>
+            <p:cNvSpPr/>
+            <p:nvPr/>
+          </p:nvSpPr>
+          <p:spPr>
+            <a:xfrm>
+              <a:off x="214840" y="209944"/>
+              <a:ext cx="2423711" cy="2379361"/>
+            </a:xfrm>
+            <a:custGeom>
+              <a:avLst/>
+              <a:gdLst/>
+              <a:ahLst/>
+              <a:cxnLst/>
+              <a:rect r="r" b="b" t="t" l="l"/>
+              <a:pathLst>
+                <a:path h="2379361" w="2423711">
+                  <a:moveTo>
+                    <a:pt x="2376764" y="1820289"/>
+                  </a:moveTo>
+                  <a:lnTo>
+                    <a:pt x="2352893" y="1820289"/>
+                  </a:lnTo>
+                  <a:lnTo>
+                    <a:pt x="2352893" y="1680326"/>
+                  </a:lnTo>
+                  <a:lnTo>
+                    <a:pt x="2376764" y="1680326"/>
+                  </a:lnTo>
+                  <a:lnTo>
+                    <a:pt x="2376764" y="1820289"/>
+                  </a:lnTo>
+                  <a:close/>
+                  <a:moveTo>
+                    <a:pt x="657250" y="0"/>
+                  </a:moveTo>
+                  <a:lnTo>
+                    <a:pt x="633379" y="0"/>
+                  </a:lnTo>
+                  <a:lnTo>
+                    <a:pt x="633379" y="139962"/>
+                  </a:lnTo>
+                  <a:lnTo>
+                    <a:pt x="657250" y="139962"/>
+                  </a:lnTo>
+                  <a:lnTo>
+                    <a:pt x="657250" y="0"/>
+                  </a:lnTo>
+                  <a:close/>
+                  <a:moveTo>
+                    <a:pt x="33419" y="690481"/>
+                  </a:moveTo>
+                  <a:lnTo>
+                    <a:pt x="16710" y="674152"/>
+                  </a:lnTo>
+                  <a:lnTo>
+                    <a:pt x="117764" y="575401"/>
+                  </a:lnTo>
+                  <a:lnTo>
+                    <a:pt x="134474" y="591730"/>
+                  </a:lnTo>
+                  <a:lnTo>
+                    <a:pt x="33419" y="690481"/>
+                  </a:lnTo>
+                  <a:close/>
+                  <a:moveTo>
+                    <a:pt x="1729858" y="27992"/>
+                  </a:moveTo>
+                  <a:lnTo>
+                    <a:pt x="1746567" y="11663"/>
+                  </a:lnTo>
+                  <a:lnTo>
+                    <a:pt x="1847622" y="110414"/>
+                  </a:lnTo>
+                  <a:lnTo>
+                    <a:pt x="1830912" y="126743"/>
+                  </a:lnTo>
+                  <a:lnTo>
+                    <a:pt x="1729858" y="27992"/>
+                  </a:lnTo>
+                  <a:close/>
+                  <a:moveTo>
+                    <a:pt x="1863536" y="664821"/>
+                  </a:moveTo>
+                  <a:lnTo>
+                    <a:pt x="1839665" y="664821"/>
+                  </a:lnTo>
+                  <a:cubicBezTo>
+                    <a:pt x="1839665" y="639161"/>
+                    <a:pt x="1818181" y="618167"/>
+                    <a:pt x="1791923" y="618167"/>
+                  </a:cubicBezTo>
+                  <a:cubicBezTo>
+                    <a:pt x="1765664" y="618167"/>
+                    <a:pt x="1744180" y="639161"/>
+                    <a:pt x="1744180" y="664821"/>
+                  </a:cubicBezTo>
+                  <a:lnTo>
+                    <a:pt x="1720309" y="664821"/>
+                  </a:lnTo>
+                  <a:cubicBezTo>
+                    <a:pt x="1720309" y="625943"/>
+                    <a:pt x="1752137" y="594840"/>
+                    <a:pt x="1791923" y="594840"/>
+                  </a:cubicBezTo>
+                  <a:cubicBezTo>
+                    <a:pt x="1830912" y="594840"/>
+                    <a:pt x="1863536" y="626720"/>
+                    <a:pt x="1863536" y="664821"/>
+                  </a:cubicBezTo>
+                  <a:close/>
+                  <a:moveTo>
+                    <a:pt x="1180823" y="1812513"/>
+                  </a:moveTo>
+                  <a:lnTo>
+                    <a:pt x="1164113" y="1796184"/>
+                  </a:lnTo>
+                  <a:lnTo>
+                    <a:pt x="1265167" y="1697433"/>
+                  </a:lnTo>
+                  <a:lnTo>
+                    <a:pt x="1281877" y="1713762"/>
+                  </a:lnTo>
+                  <a:lnTo>
+                    <a:pt x="1180823" y="1812513"/>
+                  </a:lnTo>
+                  <a:close/>
+                  <a:moveTo>
+                    <a:pt x="82753" y="1819511"/>
+                  </a:moveTo>
+                  <a:lnTo>
+                    <a:pt x="58882" y="1819511"/>
+                  </a:lnTo>
+                  <a:lnTo>
+                    <a:pt x="58882" y="1679549"/>
+                  </a:lnTo>
+                  <a:lnTo>
+                    <a:pt x="82753" y="1679549"/>
+                  </a:lnTo>
+                  <a:lnTo>
+                    <a:pt x="82753" y="1819511"/>
+                  </a:lnTo>
+                  <a:close/>
+                  <a:moveTo>
+                    <a:pt x="1803062" y="2379361"/>
+                  </a:moveTo>
+                  <a:lnTo>
+                    <a:pt x="1779191" y="2379361"/>
+                  </a:lnTo>
+                  <a:lnTo>
+                    <a:pt x="1779191" y="2239399"/>
+                  </a:lnTo>
+                  <a:lnTo>
+                    <a:pt x="1803062" y="2239399"/>
+                  </a:lnTo>
+                  <a:lnTo>
+                    <a:pt x="1803062" y="2379361"/>
+                  </a:lnTo>
+                  <a:close/>
+                  <a:moveTo>
+                    <a:pt x="143226" y="2344370"/>
+                  </a:moveTo>
+                  <a:lnTo>
+                    <a:pt x="119355" y="2344370"/>
+                  </a:lnTo>
+                  <a:cubicBezTo>
+                    <a:pt x="119355" y="2318711"/>
+                    <a:pt x="97871" y="2297716"/>
+                    <a:pt x="71613" y="2297716"/>
+                  </a:cubicBezTo>
+                  <a:cubicBezTo>
+                    <a:pt x="45355" y="2297716"/>
+                    <a:pt x="23871" y="2318711"/>
+                    <a:pt x="23871" y="2344370"/>
+                  </a:cubicBezTo>
+                  <a:lnTo>
+                    <a:pt x="0" y="2344370"/>
+                  </a:lnTo>
+                  <a:cubicBezTo>
+                    <a:pt x="0" y="2305492"/>
+                    <a:pt x="31828" y="2274389"/>
+                    <a:pt x="71613" y="2274389"/>
+                  </a:cubicBezTo>
+                  <a:cubicBezTo>
+                    <a:pt x="111398" y="2274389"/>
+                    <a:pt x="143226" y="2305492"/>
+                    <a:pt x="143226" y="2344370"/>
+                  </a:cubicBezTo>
+                  <a:close/>
+                  <a:moveTo>
+                    <a:pt x="2322656" y="127521"/>
+                  </a:moveTo>
+                  <a:lnTo>
+                    <a:pt x="2305946" y="111192"/>
+                  </a:lnTo>
+                  <a:lnTo>
+                    <a:pt x="2407001" y="12441"/>
+                  </a:lnTo>
+                  <a:lnTo>
+                    <a:pt x="2423710" y="28770"/>
+                  </a:lnTo>
+                  <a:lnTo>
+                    <a:pt x="2322656" y="127521"/>
+                  </a:lnTo>
+                  <a:close/>
+                  <a:moveTo>
+                    <a:pt x="601551" y="2370030"/>
+                  </a:moveTo>
+                  <a:lnTo>
+                    <a:pt x="584841" y="2353701"/>
+                  </a:lnTo>
+                  <a:lnTo>
+                    <a:pt x="685896" y="2254950"/>
+                  </a:lnTo>
+                  <a:lnTo>
+                    <a:pt x="702605" y="2271279"/>
+                  </a:lnTo>
+                  <a:lnTo>
+                    <a:pt x="601551" y="2370030"/>
+                  </a:lnTo>
+                  <a:close/>
+                  <a:moveTo>
+                    <a:pt x="1746567" y="1249553"/>
+                  </a:moveTo>
+                  <a:lnTo>
+                    <a:pt x="1729858" y="1233224"/>
+                  </a:lnTo>
+                  <a:lnTo>
+                    <a:pt x="1830912" y="1134473"/>
+                  </a:lnTo>
+                  <a:lnTo>
+                    <a:pt x="1847622" y="1150802"/>
+                  </a:lnTo>
+                  <a:lnTo>
+                    <a:pt x="1746567" y="1249553"/>
+                  </a:lnTo>
+                  <a:close/>
+                  <a:moveTo>
+                    <a:pt x="573701" y="1154690"/>
+                  </a:moveTo>
+                  <a:lnTo>
+                    <a:pt x="597573" y="1154690"/>
+                  </a:lnTo>
+                  <a:cubicBezTo>
+                    <a:pt x="597573" y="1180350"/>
+                    <a:pt x="619056" y="1201344"/>
+                    <a:pt x="645315" y="1201344"/>
+                  </a:cubicBezTo>
+                  <a:cubicBezTo>
+                    <a:pt x="671573" y="1201344"/>
+                    <a:pt x="693057" y="1180350"/>
+                    <a:pt x="693057" y="1154690"/>
+                  </a:cubicBezTo>
+                  <a:lnTo>
+                    <a:pt x="716928" y="1154690"/>
+                  </a:lnTo>
+                  <a:cubicBezTo>
+                    <a:pt x="716928" y="1193568"/>
+                    <a:pt x="685100" y="1224671"/>
+                    <a:pt x="645315" y="1224671"/>
+                  </a:cubicBezTo>
+                  <a:cubicBezTo>
+                    <a:pt x="606325" y="1224671"/>
+                    <a:pt x="573701" y="1193568"/>
+                    <a:pt x="573701" y="1154690"/>
+                  </a:cubicBezTo>
+                  <a:close/>
+                  <a:moveTo>
+                    <a:pt x="1863536" y="1783743"/>
+                  </a:moveTo>
+                  <a:lnTo>
+                    <a:pt x="1839665" y="1783743"/>
+                  </a:lnTo>
+                  <a:cubicBezTo>
+                    <a:pt x="1839665" y="1758083"/>
+                    <a:pt x="1818181" y="1737089"/>
+                    <a:pt x="1791923" y="1737089"/>
+                  </a:cubicBezTo>
+                  <a:cubicBezTo>
+                    <a:pt x="1765664" y="1737089"/>
+                    <a:pt x="1744180" y="1758083"/>
+                    <a:pt x="1744180" y="1783743"/>
+                  </a:cubicBezTo>
+                  <a:lnTo>
+                    <a:pt x="1720309" y="1783743"/>
+                  </a:lnTo>
+                  <a:cubicBezTo>
+                    <a:pt x="1720309" y="1744865"/>
+                    <a:pt x="1752137" y="1713762"/>
+                    <a:pt x="1791923" y="1713762"/>
+                  </a:cubicBezTo>
+                  <a:cubicBezTo>
+                    <a:pt x="1831708" y="1713762"/>
+                    <a:pt x="1863536" y="1745642"/>
+                    <a:pt x="1863536" y="1783743"/>
+                  </a:cubicBezTo>
+                  <a:close/>
+                </a:path>
+              </a:pathLst>
+            </a:custGeom>
+            <a:solidFill>
+              <a:srgbClr val="2ED47B"/>
+            </a:solidFill>
+          </p:spPr>
+        </p:sp>
+      </p:grpSp>
+      <p:grpSp>
+        <p:nvGrpSpPr>
+          <p:cNvPr name="Group 5" id="5"/>
+          <p:cNvGrpSpPr/>
+          <p:nvPr/>
+        </p:nvGrpSpPr>
+        <p:grpSpPr>
+          <a:xfrm rot="0">
+            <a:off x="4277938" y="5945392"/>
+            <a:ext cx="2912577" cy="2839113"/>
+            <a:chOff x="0" y="0"/>
+            <a:chExt cx="4589780" cy="4578350"/>
+          </a:xfrm>
+        </p:grpSpPr>
+        <p:sp>
+          <p:nvSpPr>
+            <p:cNvPr name="Freeform 6" id="6"/>
+            <p:cNvSpPr/>
+            <p:nvPr/>
+          </p:nvSpPr>
+          <p:spPr>
+            <a:xfrm>
+              <a:off x="232345" y="209944"/>
+              <a:ext cx="2418937" cy="2345148"/>
+            </a:xfrm>
+            <a:custGeom>
+              <a:avLst/>
+              <a:gdLst/>
+              <a:ahLst/>
+              <a:cxnLst/>
+              <a:rect r="r" b="b" t="t" l="l"/>
+              <a:pathLst>
+                <a:path h="2345148" w="2418937">
+                  <a:moveTo>
+                    <a:pt x="20688" y="139962"/>
+                  </a:moveTo>
+                  <a:lnTo>
+                    <a:pt x="20688" y="116635"/>
+                  </a:lnTo>
+                  <a:cubicBezTo>
+                    <a:pt x="46947" y="116635"/>
+                    <a:pt x="68431" y="95641"/>
+                    <a:pt x="68431" y="69981"/>
+                  </a:cubicBezTo>
+                  <a:cubicBezTo>
+                    <a:pt x="68431" y="44321"/>
+                    <a:pt x="46947" y="23327"/>
+                    <a:pt x="20688" y="23327"/>
+                  </a:cubicBezTo>
+                  <a:lnTo>
+                    <a:pt x="20688" y="0"/>
+                  </a:lnTo>
+                  <a:cubicBezTo>
+                    <a:pt x="60474" y="0"/>
+                    <a:pt x="92302" y="31102"/>
+                    <a:pt x="92302" y="69981"/>
+                  </a:cubicBezTo>
+                  <a:cubicBezTo>
+                    <a:pt x="92302" y="108859"/>
+                    <a:pt x="60474" y="139962"/>
+                    <a:pt x="20688" y="139962"/>
+                  </a:cubicBezTo>
+                  <a:close/>
+                  <a:moveTo>
+                    <a:pt x="1273125" y="80867"/>
+                  </a:moveTo>
+                  <a:lnTo>
+                    <a:pt x="1273125" y="57540"/>
+                  </a:lnTo>
+                  <a:lnTo>
+                    <a:pt x="1129898" y="57540"/>
+                  </a:lnTo>
+                  <a:lnTo>
+                    <a:pt x="1129898" y="80867"/>
+                  </a:lnTo>
+                  <a:lnTo>
+                    <a:pt x="1273125" y="80867"/>
+                  </a:lnTo>
+                  <a:close/>
+                  <a:moveTo>
+                    <a:pt x="1201511" y="2345148"/>
+                  </a:moveTo>
+                  <a:cubicBezTo>
+                    <a:pt x="1241297" y="2345148"/>
+                    <a:pt x="1273125" y="2314045"/>
+                    <a:pt x="1273125" y="2275167"/>
+                  </a:cubicBezTo>
+                  <a:lnTo>
+                    <a:pt x="1249254" y="2275167"/>
+                  </a:lnTo>
+                  <a:cubicBezTo>
+                    <a:pt x="1249254" y="2300827"/>
+                    <a:pt x="1227770" y="2321821"/>
+                    <a:pt x="1201511" y="2321821"/>
+                  </a:cubicBezTo>
+                  <a:cubicBezTo>
+                    <a:pt x="1175253" y="2321821"/>
+                    <a:pt x="1153769" y="2300827"/>
+                    <a:pt x="1153769" y="2275167"/>
+                  </a:cubicBezTo>
+                  <a:lnTo>
+                    <a:pt x="1129898" y="2275167"/>
+                  </a:lnTo>
+                  <a:cubicBezTo>
+                    <a:pt x="1129898" y="2313268"/>
+                    <a:pt x="1161726" y="2345148"/>
+                    <a:pt x="1201511" y="2345148"/>
+                  </a:cubicBezTo>
+                  <a:close/>
+                  <a:moveTo>
+                    <a:pt x="592799" y="1748753"/>
+                  </a:moveTo>
+                  <a:cubicBezTo>
+                    <a:pt x="592799" y="1787631"/>
+                    <a:pt x="624627" y="1818734"/>
+                    <a:pt x="664412" y="1818734"/>
+                  </a:cubicBezTo>
+                  <a:lnTo>
+                    <a:pt x="664412" y="1795407"/>
+                  </a:lnTo>
+                  <a:cubicBezTo>
+                    <a:pt x="638154" y="1795407"/>
+                    <a:pt x="616670" y="1774412"/>
+                    <a:pt x="616670" y="1748753"/>
+                  </a:cubicBezTo>
+                  <a:cubicBezTo>
+                    <a:pt x="616670" y="1723093"/>
+                    <a:pt x="638154" y="1702098"/>
+                    <a:pt x="664412" y="1702098"/>
+                  </a:cubicBezTo>
+                  <a:lnTo>
+                    <a:pt x="664412" y="1678771"/>
+                  </a:lnTo>
+                  <a:cubicBezTo>
+                    <a:pt x="625423" y="1678771"/>
+                    <a:pt x="592799" y="1710652"/>
+                    <a:pt x="592799" y="1748753"/>
+                  </a:cubicBezTo>
+                  <a:close/>
+                  <a:moveTo>
+                    <a:pt x="101054" y="1245665"/>
+                  </a:moveTo>
+                  <a:lnTo>
+                    <a:pt x="117764" y="1228559"/>
+                  </a:lnTo>
+                  <a:lnTo>
+                    <a:pt x="16710" y="1129808"/>
+                  </a:lnTo>
+                  <a:lnTo>
+                    <a:pt x="0" y="1146137"/>
+                  </a:lnTo>
+                  <a:lnTo>
+                    <a:pt x="101054" y="1245665"/>
+                  </a:lnTo>
+                  <a:close/>
+                  <a:moveTo>
+                    <a:pt x="2418937" y="644604"/>
+                  </a:moveTo>
+                  <a:lnTo>
+                    <a:pt x="2418937" y="621277"/>
+                  </a:lnTo>
+                  <a:lnTo>
+                    <a:pt x="2275710" y="621277"/>
+                  </a:lnTo>
+                  <a:lnTo>
+                    <a:pt x="2275710" y="644604"/>
+                  </a:lnTo>
+                  <a:lnTo>
+                    <a:pt x="2418937" y="644604"/>
+                  </a:lnTo>
+                  <a:close/>
+                  <a:moveTo>
+                    <a:pt x="2311517" y="1192013"/>
+                  </a:moveTo>
+                  <a:cubicBezTo>
+                    <a:pt x="2311517" y="1230892"/>
+                    <a:pt x="2343345" y="1261994"/>
+                    <a:pt x="2383130" y="1261994"/>
+                  </a:cubicBezTo>
+                  <a:lnTo>
+                    <a:pt x="2383130" y="1238667"/>
+                  </a:lnTo>
+                  <a:cubicBezTo>
+                    <a:pt x="2356872" y="1238667"/>
+                    <a:pt x="2335388" y="1217673"/>
+                    <a:pt x="2335388" y="1192013"/>
+                  </a:cubicBezTo>
+                  <a:cubicBezTo>
+                    <a:pt x="2335388" y="1166353"/>
+                    <a:pt x="2356872" y="1145359"/>
+                    <a:pt x="2383130" y="1145359"/>
+                  </a:cubicBezTo>
+                  <a:lnTo>
+                    <a:pt x="2383130" y="1122032"/>
+                  </a:lnTo>
+                  <a:cubicBezTo>
+                    <a:pt x="2344141" y="1122032"/>
+                    <a:pt x="2311517" y="1153135"/>
+                    <a:pt x="2311517" y="1192013"/>
+                  </a:cubicBezTo>
+                  <a:close/>
+                  <a:moveTo>
+                    <a:pt x="1235727" y="630608"/>
+                  </a:moveTo>
+                  <a:cubicBezTo>
+                    <a:pt x="1235727" y="591730"/>
+                    <a:pt x="1203899" y="560627"/>
+                    <a:pt x="1164113" y="560627"/>
+                  </a:cubicBezTo>
+                  <a:lnTo>
+                    <a:pt x="1164113" y="583954"/>
+                  </a:lnTo>
+                  <a:cubicBezTo>
+                    <a:pt x="1190372" y="583954"/>
+                    <a:pt x="1211856" y="604948"/>
+                    <a:pt x="1211856" y="630608"/>
+                  </a:cubicBezTo>
+                  <a:cubicBezTo>
+                    <a:pt x="1211856" y="656268"/>
+                    <a:pt x="1190372" y="677262"/>
+                    <a:pt x="1164113" y="677262"/>
+                  </a:cubicBezTo>
+                  <a:lnTo>
+                    <a:pt x="1164113" y="700589"/>
+                  </a:lnTo>
+                  <a:cubicBezTo>
+                    <a:pt x="1203899" y="700589"/>
+                    <a:pt x="1235727" y="668709"/>
+                    <a:pt x="1235727" y="630608"/>
+                  </a:cubicBezTo>
+                  <a:close/>
+                  <a:moveTo>
+                    <a:pt x="639745" y="559072"/>
+                  </a:moveTo>
+                  <a:lnTo>
+                    <a:pt x="615874" y="559072"/>
+                  </a:lnTo>
+                  <a:lnTo>
+                    <a:pt x="615874" y="699034"/>
+                  </a:lnTo>
+                  <a:lnTo>
+                    <a:pt x="639745" y="699034"/>
+                  </a:lnTo>
+                  <a:lnTo>
+                    <a:pt x="639745" y="559072"/>
+                  </a:lnTo>
+                  <a:close/>
+                  <a:moveTo>
+                    <a:pt x="1272329" y="1201344"/>
+                  </a:moveTo>
+                  <a:lnTo>
+                    <a:pt x="1272329" y="1178017"/>
+                  </a:lnTo>
+                  <a:lnTo>
+                    <a:pt x="1129103" y="1178017"/>
+                  </a:lnTo>
+                  <a:lnTo>
+                    <a:pt x="1129103" y="1201344"/>
+                  </a:lnTo>
+                  <a:lnTo>
+                    <a:pt x="1272329" y="1201344"/>
+                  </a:lnTo>
+                  <a:close/>
+                  <a:moveTo>
+                    <a:pt x="2418937" y="2320266"/>
+                  </a:moveTo>
+                  <a:lnTo>
+                    <a:pt x="2418937" y="2296939"/>
+                  </a:lnTo>
+                  <a:lnTo>
+                    <a:pt x="2275710" y="2296939"/>
+                  </a:lnTo>
+                  <a:lnTo>
+                    <a:pt x="2275710" y="2320266"/>
+                  </a:lnTo>
+                  <a:lnTo>
+                    <a:pt x="2418937" y="2320266"/>
+                  </a:lnTo>
+                  <a:close/>
+                </a:path>
+              </a:pathLst>
+            </a:custGeom>
+            <a:solidFill>
+              <a:srgbClr val="383838"/>
+            </a:solidFill>
+          </p:spPr>
+        </p:sp>
+        <p:sp>
+          <p:nvSpPr>
+            <p:cNvPr name="Freeform 7" id="7"/>
+            <p:cNvSpPr/>
+            <p:nvPr/>
+          </p:nvSpPr>
+          <p:spPr>
+            <a:xfrm>
+              <a:off x="214840" y="209944"/>
+              <a:ext cx="2423711" cy="2379361"/>
+            </a:xfrm>
+            <a:custGeom>
+              <a:avLst/>
+              <a:gdLst/>
+              <a:ahLst/>
+              <a:cxnLst/>
+              <a:rect r="r" b="b" t="t" l="l"/>
+              <a:pathLst>
+                <a:path h="2379361" w="2423711">
+                  <a:moveTo>
+                    <a:pt x="2376764" y="1820289"/>
+                  </a:moveTo>
+                  <a:lnTo>
+                    <a:pt x="2352893" y="1820289"/>
+                  </a:lnTo>
+                  <a:lnTo>
+                    <a:pt x="2352893" y="1680326"/>
+                  </a:lnTo>
+                  <a:lnTo>
+                    <a:pt x="2376764" y="1680326"/>
+                  </a:lnTo>
+                  <a:lnTo>
+                    <a:pt x="2376764" y="1820289"/>
+                  </a:lnTo>
+                  <a:close/>
+                  <a:moveTo>
+                    <a:pt x="657250" y="0"/>
+                  </a:moveTo>
+                  <a:lnTo>
+                    <a:pt x="633379" y="0"/>
+                  </a:lnTo>
+                  <a:lnTo>
+                    <a:pt x="633379" y="139962"/>
+                  </a:lnTo>
+                  <a:lnTo>
+                    <a:pt x="657250" y="139962"/>
+                  </a:lnTo>
+                  <a:lnTo>
+                    <a:pt x="657250" y="0"/>
+                  </a:lnTo>
+                  <a:close/>
+                  <a:moveTo>
+                    <a:pt x="33419" y="690481"/>
+                  </a:moveTo>
+                  <a:lnTo>
+                    <a:pt x="16710" y="674152"/>
+                  </a:lnTo>
+                  <a:lnTo>
+                    <a:pt x="117764" y="575401"/>
+                  </a:lnTo>
+                  <a:lnTo>
+                    <a:pt x="134474" y="591730"/>
+                  </a:lnTo>
+                  <a:lnTo>
+                    <a:pt x="33419" y="690481"/>
+                  </a:lnTo>
+                  <a:close/>
+                  <a:moveTo>
+                    <a:pt x="1729858" y="27992"/>
+                  </a:moveTo>
+                  <a:lnTo>
+                    <a:pt x="1746567" y="11663"/>
+                  </a:lnTo>
+                  <a:lnTo>
+                    <a:pt x="1847622" y="110414"/>
+                  </a:lnTo>
+                  <a:lnTo>
+                    <a:pt x="1830912" y="126743"/>
+                  </a:lnTo>
+                  <a:lnTo>
+                    <a:pt x="1729858" y="27992"/>
+                  </a:lnTo>
+                  <a:close/>
+                  <a:moveTo>
+                    <a:pt x="1863536" y="664821"/>
+                  </a:moveTo>
+                  <a:lnTo>
+                    <a:pt x="1839665" y="664821"/>
+                  </a:lnTo>
+                  <a:cubicBezTo>
+                    <a:pt x="1839665" y="639161"/>
+                    <a:pt x="1818181" y="618167"/>
+                    <a:pt x="1791923" y="618167"/>
+                  </a:cubicBezTo>
+                  <a:cubicBezTo>
+                    <a:pt x="1765664" y="618167"/>
+                    <a:pt x="1744180" y="639161"/>
+                    <a:pt x="1744180" y="664821"/>
+                  </a:cubicBezTo>
+                  <a:lnTo>
+                    <a:pt x="1720309" y="664821"/>
+                  </a:lnTo>
+                  <a:cubicBezTo>
+                    <a:pt x="1720309" y="625943"/>
+                    <a:pt x="1752137" y="594840"/>
+                    <a:pt x="1791923" y="594840"/>
+                  </a:cubicBezTo>
+                  <a:cubicBezTo>
+                    <a:pt x="1830912" y="594840"/>
+                    <a:pt x="1863536" y="626720"/>
+                    <a:pt x="1863536" y="664821"/>
+                  </a:cubicBezTo>
+                  <a:close/>
+                  <a:moveTo>
+                    <a:pt x="1180823" y="1812513"/>
+                  </a:moveTo>
+                  <a:lnTo>
+                    <a:pt x="1164113" y="1796184"/>
+                  </a:lnTo>
+                  <a:lnTo>
+                    <a:pt x="1265167" y="1697433"/>
+                  </a:lnTo>
+                  <a:lnTo>
+                    <a:pt x="1281877" y="1713762"/>
+                  </a:lnTo>
+                  <a:lnTo>
+                    <a:pt x="1180823" y="1812513"/>
+                  </a:lnTo>
+                  <a:close/>
+                  <a:moveTo>
+                    <a:pt x="82753" y="1819511"/>
+                  </a:moveTo>
+                  <a:lnTo>
+                    <a:pt x="58882" y="1819511"/>
+                  </a:lnTo>
+                  <a:lnTo>
+                    <a:pt x="58882" y="1679549"/>
+                  </a:lnTo>
+                  <a:lnTo>
+                    <a:pt x="82753" y="1679549"/>
+                  </a:lnTo>
+                  <a:lnTo>
+                    <a:pt x="82753" y="1819511"/>
+                  </a:lnTo>
+                  <a:close/>
+                  <a:moveTo>
+                    <a:pt x="1803062" y="2379361"/>
+                  </a:moveTo>
+                  <a:lnTo>
+                    <a:pt x="1779191" y="2379361"/>
+                  </a:lnTo>
+                  <a:lnTo>
+                    <a:pt x="1779191" y="2239399"/>
+                  </a:lnTo>
+                  <a:lnTo>
+                    <a:pt x="1803062" y="2239399"/>
+                  </a:lnTo>
+                  <a:lnTo>
+                    <a:pt x="1803062" y="2379361"/>
+                  </a:lnTo>
+                  <a:close/>
+                  <a:moveTo>
+                    <a:pt x="143226" y="2344370"/>
+                  </a:moveTo>
+                  <a:lnTo>
+                    <a:pt x="119355" y="2344370"/>
+                  </a:lnTo>
+                  <a:cubicBezTo>
+                    <a:pt x="119355" y="2318711"/>
+                    <a:pt x="97871" y="2297716"/>
+                    <a:pt x="71613" y="2297716"/>
+                  </a:cubicBezTo>
+                  <a:cubicBezTo>
+                    <a:pt x="45355" y="2297716"/>
+                    <a:pt x="23871" y="2318711"/>
+                    <a:pt x="23871" y="2344370"/>
+                  </a:cubicBezTo>
+                  <a:lnTo>
+                    <a:pt x="0" y="2344370"/>
+                  </a:lnTo>
+                  <a:cubicBezTo>
+                    <a:pt x="0" y="2305492"/>
+                    <a:pt x="31828" y="2274389"/>
+                    <a:pt x="71613" y="2274389"/>
+                  </a:cubicBezTo>
+                  <a:cubicBezTo>
+                    <a:pt x="111398" y="2274389"/>
+                    <a:pt x="143226" y="2305492"/>
+                    <a:pt x="143226" y="2344370"/>
+                  </a:cubicBezTo>
+                  <a:close/>
+                  <a:moveTo>
+                    <a:pt x="2322656" y="127521"/>
+                  </a:moveTo>
+                  <a:lnTo>
+                    <a:pt x="2305946" y="111192"/>
+                  </a:lnTo>
+                  <a:lnTo>
+                    <a:pt x="2407001" y="12441"/>
+                  </a:lnTo>
+                  <a:lnTo>
+                    <a:pt x="2423710" y="28770"/>
+                  </a:lnTo>
+                  <a:lnTo>
+                    <a:pt x="2322656" y="127521"/>
+                  </a:lnTo>
+                  <a:close/>
+                  <a:moveTo>
+                    <a:pt x="601551" y="2370030"/>
+                  </a:moveTo>
+                  <a:lnTo>
+                    <a:pt x="584841" y="2353701"/>
+                  </a:lnTo>
+                  <a:lnTo>
+                    <a:pt x="685896" y="2254950"/>
+                  </a:lnTo>
+                  <a:lnTo>
+                    <a:pt x="702605" y="2271279"/>
+                  </a:lnTo>
+                  <a:lnTo>
+                    <a:pt x="601551" y="2370030"/>
+                  </a:lnTo>
+                  <a:close/>
+                  <a:moveTo>
+                    <a:pt x="1746567" y="1249553"/>
+                  </a:moveTo>
+                  <a:lnTo>
+                    <a:pt x="1729858" y="1233224"/>
+                  </a:lnTo>
+                  <a:lnTo>
+                    <a:pt x="1830912" y="1134473"/>
+                  </a:lnTo>
+                  <a:lnTo>
+                    <a:pt x="1847622" y="1150802"/>
+                  </a:lnTo>
+                  <a:lnTo>
+                    <a:pt x="1746567" y="1249553"/>
+                  </a:lnTo>
+                  <a:close/>
+                  <a:moveTo>
+                    <a:pt x="573701" y="1154690"/>
+                  </a:moveTo>
+                  <a:lnTo>
+                    <a:pt x="597573" y="1154690"/>
+                  </a:lnTo>
+                  <a:cubicBezTo>
+                    <a:pt x="597573" y="1180350"/>
+                    <a:pt x="619056" y="1201344"/>
+                    <a:pt x="645315" y="1201344"/>
+                  </a:cubicBezTo>
+                  <a:cubicBezTo>
+                    <a:pt x="671573" y="1201344"/>
+                    <a:pt x="693057" y="1180350"/>
+                    <a:pt x="693057" y="1154690"/>
+                  </a:cubicBezTo>
+                  <a:lnTo>
+                    <a:pt x="716928" y="1154690"/>
+                  </a:lnTo>
+                  <a:cubicBezTo>
+                    <a:pt x="716928" y="1193568"/>
+                    <a:pt x="685100" y="1224671"/>
+                    <a:pt x="645315" y="1224671"/>
+                  </a:cubicBezTo>
+                  <a:cubicBezTo>
+                    <a:pt x="606325" y="1224671"/>
+                    <a:pt x="573701" y="1193568"/>
+                    <a:pt x="573701" y="1154690"/>
+                  </a:cubicBezTo>
+                  <a:close/>
+                  <a:moveTo>
+                    <a:pt x="1863536" y="1783743"/>
+                  </a:moveTo>
+                  <a:lnTo>
+                    <a:pt x="1839665" y="1783743"/>
+                  </a:lnTo>
+                  <a:cubicBezTo>
+                    <a:pt x="1839665" y="1758083"/>
+                    <a:pt x="1818181" y="1737089"/>
+                    <a:pt x="1791923" y="1737089"/>
+                  </a:cubicBezTo>
+                  <a:cubicBezTo>
+                    <a:pt x="1765664" y="1737089"/>
+                    <a:pt x="1744180" y="1758083"/>
+                    <a:pt x="1744180" y="1783743"/>
+                  </a:cubicBezTo>
+                  <a:lnTo>
+                    <a:pt x="1720309" y="1783743"/>
+                  </a:lnTo>
+                  <a:cubicBezTo>
+                    <a:pt x="1720309" y="1744865"/>
+                    <a:pt x="1752137" y="1713762"/>
+                    <a:pt x="1791923" y="1713762"/>
+                  </a:cubicBezTo>
+                  <a:cubicBezTo>
+                    <a:pt x="1831708" y="1713762"/>
+                    <a:pt x="1863536" y="1745642"/>
+                    <a:pt x="1863536" y="1783743"/>
+                  </a:cubicBezTo>
+                  <a:close/>
+                </a:path>
+              </a:pathLst>
+            </a:custGeom>
+            <a:solidFill>
+              <a:srgbClr val="2ED47B"/>
+            </a:solidFill>
+          </p:spPr>
+        </p:sp>
+      </p:grpSp>
+      <p:pic>
+        <p:nvPicPr>
+          <p:cNvPr name="Picture 8" id="8"/>
+          <p:cNvPicPr>
+            <a:picLocks noChangeAspect="true"/>
+          </p:cNvPicPr>
+          <p:nvPr/>
+        </p:nvPicPr>
+        <p:blipFill>
+          <a:blip r:embed="rId2"/>
+          <a:srcRect l="0" t="0" r="0" b="0"/>
+          <a:stretch>
+            <a:fillRect/>
+          </a:stretch>
+        </p:blipFill>
+        <p:spPr>
+          <a:xfrm flipH="false" flipV="false" rot="0">
+            <a:off x="6134258" y="2615317"/>
+            <a:ext cx="6019484" cy="5056367"/>
+          </a:xfrm>
+          <a:prstGeom prst="rect">
+            <a:avLst/>
+          </a:prstGeom>
+        </p:spPr>
+      </p:pic>
+      <p:grpSp>
+        <p:nvGrpSpPr>
+          <p:cNvPr name="Group 9" id="9"/>
+          <p:cNvGrpSpPr/>
+          <p:nvPr/>
+        </p:nvGrpSpPr>
+        <p:grpSpPr>
+          <a:xfrm rot="0">
+            <a:off x="-2897619" y="7671683"/>
+            <a:ext cx="6216356" cy="6216356"/>
+            <a:chOff x="0" y="0"/>
+            <a:chExt cx="6350000" cy="6350000"/>
+          </a:xfrm>
+        </p:grpSpPr>
+        <p:sp>
+          <p:nvSpPr>
+            <p:cNvPr name="Freeform 10" id="10"/>
+            <p:cNvSpPr/>
+            <p:nvPr/>
+          </p:nvSpPr>
+          <p:spPr>
+            <a:xfrm>
+              <a:off x="14167" y="0"/>
+              <a:ext cx="6321665" cy="6350000"/>
+            </a:xfrm>
+            <a:custGeom>
+              <a:avLst/>
+              <a:gdLst/>
+              <a:ahLst/>
+              <a:cxnLst/>
+              <a:rect r="r" b="b" t="t" l="l"/>
+              <a:pathLst>
+                <a:path h="6350000" w="6321665">
+                  <a:moveTo>
+                    <a:pt x="3160833" y="0"/>
+                  </a:moveTo>
+                  <a:lnTo>
+                    <a:pt x="3160833" y="0"/>
+                  </a:lnTo>
+                  <a:cubicBezTo>
+                    <a:pt x="4908795" y="7817"/>
+                    <a:pt x="6321666" y="1427021"/>
+                    <a:pt x="6321666" y="3175000"/>
+                  </a:cubicBezTo>
+                  <a:cubicBezTo>
+                    <a:pt x="6321666" y="4922979"/>
+                    <a:pt x="4908795" y="6342183"/>
+                    <a:pt x="3160833" y="6350000"/>
+                  </a:cubicBezTo>
+                  <a:cubicBezTo>
+                    <a:pt x="1412871" y="6342183"/>
+                    <a:pt x="0" y="4922979"/>
+                    <a:pt x="0" y="3175000"/>
+                  </a:cubicBezTo>
+                  <a:cubicBezTo>
+                    <a:pt x="0" y="1427021"/>
+                    <a:pt x="1412871" y="7817"/>
+                    <a:pt x="3160833" y="0"/>
+                  </a:cubicBezTo>
+                  <a:close/>
+                </a:path>
+              </a:pathLst>
+            </a:custGeom>
+            <a:solidFill>
+              <a:srgbClr val="242725">
+                <a:alpha val="4705"/>
+              </a:srgbClr>
+            </a:solidFill>
+          </p:spPr>
+        </p:sp>
+      </p:grpSp>
+      <p:grpSp>
+        <p:nvGrpSpPr>
+          <p:cNvPr name="Group 11" id="11"/>
+          <p:cNvGrpSpPr/>
+          <p:nvPr/>
+        </p:nvGrpSpPr>
+        <p:grpSpPr>
+          <a:xfrm rot="0">
+            <a:off x="15173159" y="-3763194"/>
+            <a:ext cx="6216356" cy="6216356"/>
+            <a:chOff x="0" y="0"/>
+            <a:chExt cx="6350000" cy="6350000"/>
+          </a:xfrm>
+        </p:grpSpPr>
+        <p:sp>
+          <p:nvSpPr>
+            <p:cNvPr name="Freeform 12" id="12"/>
+            <p:cNvSpPr/>
+            <p:nvPr/>
+          </p:nvSpPr>
+          <p:spPr>
+            <a:xfrm>
+              <a:off x="14167" y="0"/>
+              <a:ext cx="6321665" cy="6350000"/>
+            </a:xfrm>
+            <a:custGeom>
+              <a:avLst/>
+              <a:gdLst/>
+              <a:ahLst/>
+              <a:cxnLst/>
+              <a:rect r="r" b="b" t="t" l="l"/>
+              <a:pathLst>
+                <a:path h="6350000" w="6321665">
+                  <a:moveTo>
+                    <a:pt x="3160833" y="0"/>
+                  </a:moveTo>
+                  <a:lnTo>
+                    <a:pt x="3160833" y="0"/>
+                  </a:lnTo>
+                  <a:cubicBezTo>
+                    <a:pt x="4908795" y="7817"/>
+                    <a:pt x="6321666" y="1427021"/>
+                    <a:pt x="6321666" y="3175000"/>
+                  </a:cubicBezTo>
+                  <a:cubicBezTo>
+                    <a:pt x="6321666" y="4922979"/>
+                    <a:pt x="4908795" y="6342183"/>
+                    <a:pt x="3160833" y="6350000"/>
+                  </a:cubicBezTo>
+                  <a:cubicBezTo>
+                    <a:pt x="1412871" y="6342183"/>
+                    <a:pt x="0" y="4922979"/>
+                    <a:pt x="0" y="3175000"/>
+                  </a:cubicBezTo>
+                  <a:cubicBezTo>
+                    <a:pt x="0" y="1427021"/>
+                    <a:pt x="1412871" y="7817"/>
+                    <a:pt x="3160833" y="0"/>
+                  </a:cubicBezTo>
+                  <a:close/>
+                </a:path>
+              </a:pathLst>
+            </a:custGeom>
+            <a:solidFill>
+              <a:srgbClr val="242725">
+                <a:alpha val="4705"/>
+              </a:srgbClr>
+            </a:solidFill>
+          </p:spPr>
+        </p:sp>
+      </p:grpSp>
       <p:sp>
         <p:nvSpPr>
-          <p:cNvPr name="TextBox 2" id="2"/>
+          <p:cNvPr name="TextBox 13" id="13"/>
           <p:cNvSpPr txBox="true"/>
           <p:nvPr/>
         </p:nvSpPr>
@@ -10396,1224 +11918,9 @@
           </a:p>
         </p:txBody>
       </p:sp>
-      <p:grpSp>
-        <p:nvGrpSpPr>
-          <p:cNvPr name="Group 3" id="3"/>
-          <p:cNvGrpSpPr/>
-          <p:nvPr/>
-        </p:nvGrpSpPr>
-        <p:grpSpPr>
-          <a:xfrm rot="0">
-            <a:off x="10211329" y="885314"/>
-            <a:ext cx="2912577" cy="2839113"/>
-            <a:chOff x="0" y="0"/>
-            <a:chExt cx="4589780" cy="4578350"/>
-          </a:xfrm>
-        </p:grpSpPr>
-        <p:sp>
-          <p:nvSpPr>
-            <p:cNvPr name="Freeform 4" id="4"/>
-            <p:cNvSpPr/>
-            <p:nvPr/>
-          </p:nvSpPr>
-          <p:spPr>
-            <a:xfrm>
-              <a:off x="232345" y="209944"/>
-              <a:ext cx="2418937" cy="2345148"/>
-            </a:xfrm>
-            <a:custGeom>
-              <a:avLst/>
-              <a:gdLst/>
-              <a:ahLst/>
-              <a:cxnLst/>
-              <a:rect r="r" b="b" t="t" l="l"/>
-              <a:pathLst>
-                <a:path h="2345148" w="2418937">
-                  <a:moveTo>
-                    <a:pt x="20688" y="139962"/>
-                  </a:moveTo>
-                  <a:lnTo>
-                    <a:pt x="20688" y="116635"/>
-                  </a:lnTo>
-                  <a:cubicBezTo>
-                    <a:pt x="46947" y="116635"/>
-                    <a:pt x="68431" y="95641"/>
-                    <a:pt x="68431" y="69981"/>
-                  </a:cubicBezTo>
-                  <a:cubicBezTo>
-                    <a:pt x="68431" y="44321"/>
-                    <a:pt x="46947" y="23327"/>
-                    <a:pt x="20688" y="23327"/>
-                  </a:cubicBezTo>
-                  <a:lnTo>
-                    <a:pt x="20688" y="0"/>
-                  </a:lnTo>
-                  <a:cubicBezTo>
-                    <a:pt x="60474" y="0"/>
-                    <a:pt x="92302" y="31102"/>
-                    <a:pt x="92302" y="69981"/>
-                  </a:cubicBezTo>
-                  <a:cubicBezTo>
-                    <a:pt x="92302" y="108859"/>
-                    <a:pt x="60474" y="139962"/>
-                    <a:pt x="20688" y="139962"/>
-                  </a:cubicBezTo>
-                  <a:close/>
-                  <a:moveTo>
-                    <a:pt x="1273125" y="80867"/>
-                  </a:moveTo>
-                  <a:lnTo>
-                    <a:pt x="1273125" y="57540"/>
-                  </a:lnTo>
-                  <a:lnTo>
-                    <a:pt x="1129898" y="57540"/>
-                  </a:lnTo>
-                  <a:lnTo>
-                    <a:pt x="1129898" y="80867"/>
-                  </a:lnTo>
-                  <a:lnTo>
-                    <a:pt x="1273125" y="80867"/>
-                  </a:lnTo>
-                  <a:close/>
-                  <a:moveTo>
-                    <a:pt x="1201511" y="2345148"/>
-                  </a:moveTo>
-                  <a:cubicBezTo>
-                    <a:pt x="1241297" y="2345148"/>
-                    <a:pt x="1273125" y="2314045"/>
-                    <a:pt x="1273125" y="2275167"/>
-                  </a:cubicBezTo>
-                  <a:lnTo>
-                    <a:pt x="1249254" y="2275167"/>
-                  </a:lnTo>
-                  <a:cubicBezTo>
-                    <a:pt x="1249254" y="2300827"/>
-                    <a:pt x="1227770" y="2321821"/>
-                    <a:pt x="1201511" y="2321821"/>
-                  </a:cubicBezTo>
-                  <a:cubicBezTo>
-                    <a:pt x="1175253" y="2321821"/>
-                    <a:pt x="1153769" y="2300827"/>
-                    <a:pt x="1153769" y="2275167"/>
-                  </a:cubicBezTo>
-                  <a:lnTo>
-                    <a:pt x="1129898" y="2275167"/>
-                  </a:lnTo>
-                  <a:cubicBezTo>
-                    <a:pt x="1129898" y="2313268"/>
-                    <a:pt x="1161726" y="2345148"/>
-                    <a:pt x="1201511" y="2345148"/>
-                  </a:cubicBezTo>
-                  <a:close/>
-                  <a:moveTo>
-                    <a:pt x="592799" y="1748753"/>
-                  </a:moveTo>
-                  <a:cubicBezTo>
-                    <a:pt x="592799" y="1787631"/>
-                    <a:pt x="624627" y="1818734"/>
-                    <a:pt x="664412" y="1818734"/>
-                  </a:cubicBezTo>
-                  <a:lnTo>
-                    <a:pt x="664412" y="1795407"/>
-                  </a:lnTo>
-                  <a:cubicBezTo>
-                    <a:pt x="638154" y="1795407"/>
-                    <a:pt x="616670" y="1774412"/>
-                    <a:pt x="616670" y="1748753"/>
-                  </a:cubicBezTo>
-                  <a:cubicBezTo>
-                    <a:pt x="616670" y="1723093"/>
-                    <a:pt x="638154" y="1702098"/>
-                    <a:pt x="664412" y="1702098"/>
-                  </a:cubicBezTo>
-                  <a:lnTo>
-                    <a:pt x="664412" y="1678771"/>
-                  </a:lnTo>
-                  <a:cubicBezTo>
-                    <a:pt x="625423" y="1678771"/>
-                    <a:pt x="592799" y="1710652"/>
-                    <a:pt x="592799" y="1748753"/>
-                  </a:cubicBezTo>
-                  <a:close/>
-                  <a:moveTo>
-                    <a:pt x="101054" y="1245665"/>
-                  </a:moveTo>
-                  <a:lnTo>
-                    <a:pt x="117764" y="1228559"/>
-                  </a:lnTo>
-                  <a:lnTo>
-                    <a:pt x="16710" y="1129808"/>
-                  </a:lnTo>
-                  <a:lnTo>
-                    <a:pt x="0" y="1146137"/>
-                  </a:lnTo>
-                  <a:lnTo>
-                    <a:pt x="101054" y="1245665"/>
-                  </a:lnTo>
-                  <a:close/>
-                  <a:moveTo>
-                    <a:pt x="2418937" y="644604"/>
-                  </a:moveTo>
-                  <a:lnTo>
-                    <a:pt x="2418937" y="621277"/>
-                  </a:lnTo>
-                  <a:lnTo>
-                    <a:pt x="2275710" y="621277"/>
-                  </a:lnTo>
-                  <a:lnTo>
-                    <a:pt x="2275710" y="644604"/>
-                  </a:lnTo>
-                  <a:lnTo>
-                    <a:pt x="2418937" y="644604"/>
-                  </a:lnTo>
-                  <a:close/>
-                  <a:moveTo>
-                    <a:pt x="2311517" y="1192013"/>
-                  </a:moveTo>
-                  <a:cubicBezTo>
-                    <a:pt x="2311517" y="1230892"/>
-                    <a:pt x="2343345" y="1261994"/>
-                    <a:pt x="2383130" y="1261994"/>
-                  </a:cubicBezTo>
-                  <a:lnTo>
-                    <a:pt x="2383130" y="1238667"/>
-                  </a:lnTo>
-                  <a:cubicBezTo>
-                    <a:pt x="2356872" y="1238667"/>
-                    <a:pt x="2335388" y="1217673"/>
-                    <a:pt x="2335388" y="1192013"/>
-                  </a:cubicBezTo>
-                  <a:cubicBezTo>
-                    <a:pt x="2335388" y="1166353"/>
-                    <a:pt x="2356872" y="1145359"/>
-                    <a:pt x="2383130" y="1145359"/>
-                  </a:cubicBezTo>
-                  <a:lnTo>
-                    <a:pt x="2383130" y="1122032"/>
-                  </a:lnTo>
-                  <a:cubicBezTo>
-                    <a:pt x="2344141" y="1122032"/>
-                    <a:pt x="2311517" y="1153135"/>
-                    <a:pt x="2311517" y="1192013"/>
-                  </a:cubicBezTo>
-                  <a:close/>
-                  <a:moveTo>
-                    <a:pt x="1235727" y="630608"/>
-                  </a:moveTo>
-                  <a:cubicBezTo>
-                    <a:pt x="1235727" y="591730"/>
-                    <a:pt x="1203899" y="560627"/>
-                    <a:pt x="1164113" y="560627"/>
-                  </a:cubicBezTo>
-                  <a:lnTo>
-                    <a:pt x="1164113" y="583954"/>
-                  </a:lnTo>
-                  <a:cubicBezTo>
-                    <a:pt x="1190372" y="583954"/>
-                    <a:pt x="1211856" y="604948"/>
-                    <a:pt x="1211856" y="630608"/>
-                  </a:cubicBezTo>
-                  <a:cubicBezTo>
-                    <a:pt x="1211856" y="656268"/>
-                    <a:pt x="1190372" y="677262"/>
-                    <a:pt x="1164113" y="677262"/>
-                  </a:cubicBezTo>
-                  <a:lnTo>
-                    <a:pt x="1164113" y="700589"/>
-                  </a:lnTo>
-                  <a:cubicBezTo>
-                    <a:pt x="1203899" y="700589"/>
-                    <a:pt x="1235727" y="668709"/>
-                    <a:pt x="1235727" y="630608"/>
-                  </a:cubicBezTo>
-                  <a:close/>
-                  <a:moveTo>
-                    <a:pt x="639745" y="559072"/>
-                  </a:moveTo>
-                  <a:lnTo>
-                    <a:pt x="615874" y="559072"/>
-                  </a:lnTo>
-                  <a:lnTo>
-                    <a:pt x="615874" y="699034"/>
-                  </a:lnTo>
-                  <a:lnTo>
-                    <a:pt x="639745" y="699034"/>
-                  </a:lnTo>
-                  <a:lnTo>
-                    <a:pt x="639745" y="559072"/>
-                  </a:lnTo>
-                  <a:close/>
-                  <a:moveTo>
-                    <a:pt x="1272329" y="1201344"/>
-                  </a:moveTo>
-                  <a:lnTo>
-                    <a:pt x="1272329" y="1178017"/>
-                  </a:lnTo>
-                  <a:lnTo>
-                    <a:pt x="1129103" y="1178017"/>
-                  </a:lnTo>
-                  <a:lnTo>
-                    <a:pt x="1129103" y="1201344"/>
-                  </a:lnTo>
-                  <a:lnTo>
-                    <a:pt x="1272329" y="1201344"/>
-                  </a:lnTo>
-                  <a:close/>
-                  <a:moveTo>
-                    <a:pt x="2418937" y="2320266"/>
-                  </a:moveTo>
-                  <a:lnTo>
-                    <a:pt x="2418937" y="2296939"/>
-                  </a:lnTo>
-                  <a:lnTo>
-                    <a:pt x="2275710" y="2296939"/>
-                  </a:lnTo>
-                  <a:lnTo>
-                    <a:pt x="2275710" y="2320266"/>
-                  </a:lnTo>
-                  <a:lnTo>
-                    <a:pt x="2418937" y="2320266"/>
-                  </a:lnTo>
-                  <a:close/>
-                </a:path>
-              </a:pathLst>
-            </a:custGeom>
-            <a:solidFill>
-              <a:srgbClr val="383838"/>
-            </a:solidFill>
-          </p:spPr>
-        </p:sp>
-        <p:sp>
-          <p:nvSpPr>
-            <p:cNvPr name="Freeform 5" id="5"/>
-            <p:cNvSpPr/>
-            <p:nvPr/>
-          </p:nvSpPr>
-          <p:spPr>
-            <a:xfrm>
-              <a:off x="214840" y="209944"/>
-              <a:ext cx="2423711" cy="2379361"/>
-            </a:xfrm>
-            <a:custGeom>
-              <a:avLst/>
-              <a:gdLst/>
-              <a:ahLst/>
-              <a:cxnLst/>
-              <a:rect r="r" b="b" t="t" l="l"/>
-              <a:pathLst>
-                <a:path h="2379361" w="2423711">
-                  <a:moveTo>
-                    <a:pt x="2376764" y="1820289"/>
-                  </a:moveTo>
-                  <a:lnTo>
-                    <a:pt x="2352893" y="1820289"/>
-                  </a:lnTo>
-                  <a:lnTo>
-                    <a:pt x="2352893" y="1680326"/>
-                  </a:lnTo>
-                  <a:lnTo>
-                    <a:pt x="2376764" y="1680326"/>
-                  </a:lnTo>
-                  <a:lnTo>
-                    <a:pt x="2376764" y="1820289"/>
-                  </a:lnTo>
-                  <a:close/>
-                  <a:moveTo>
-                    <a:pt x="657250" y="0"/>
-                  </a:moveTo>
-                  <a:lnTo>
-                    <a:pt x="633379" y="0"/>
-                  </a:lnTo>
-                  <a:lnTo>
-                    <a:pt x="633379" y="139962"/>
-                  </a:lnTo>
-                  <a:lnTo>
-                    <a:pt x="657250" y="139962"/>
-                  </a:lnTo>
-                  <a:lnTo>
-                    <a:pt x="657250" y="0"/>
-                  </a:lnTo>
-                  <a:close/>
-                  <a:moveTo>
-                    <a:pt x="33419" y="690481"/>
-                  </a:moveTo>
-                  <a:lnTo>
-                    <a:pt x="16710" y="674152"/>
-                  </a:lnTo>
-                  <a:lnTo>
-                    <a:pt x="117764" y="575401"/>
-                  </a:lnTo>
-                  <a:lnTo>
-                    <a:pt x="134474" y="591730"/>
-                  </a:lnTo>
-                  <a:lnTo>
-                    <a:pt x="33419" y="690481"/>
-                  </a:lnTo>
-                  <a:close/>
-                  <a:moveTo>
-                    <a:pt x="1729858" y="27992"/>
-                  </a:moveTo>
-                  <a:lnTo>
-                    <a:pt x="1746567" y="11663"/>
-                  </a:lnTo>
-                  <a:lnTo>
-                    <a:pt x="1847622" y="110414"/>
-                  </a:lnTo>
-                  <a:lnTo>
-                    <a:pt x="1830912" y="126743"/>
-                  </a:lnTo>
-                  <a:lnTo>
-                    <a:pt x="1729858" y="27992"/>
-                  </a:lnTo>
-                  <a:close/>
-                  <a:moveTo>
-                    <a:pt x="1863536" y="664821"/>
-                  </a:moveTo>
-                  <a:lnTo>
-                    <a:pt x="1839665" y="664821"/>
-                  </a:lnTo>
-                  <a:cubicBezTo>
-                    <a:pt x="1839665" y="639161"/>
-                    <a:pt x="1818181" y="618167"/>
-                    <a:pt x="1791923" y="618167"/>
-                  </a:cubicBezTo>
-                  <a:cubicBezTo>
-                    <a:pt x="1765664" y="618167"/>
-                    <a:pt x="1744180" y="639161"/>
-                    <a:pt x="1744180" y="664821"/>
-                  </a:cubicBezTo>
-                  <a:lnTo>
-                    <a:pt x="1720309" y="664821"/>
-                  </a:lnTo>
-                  <a:cubicBezTo>
-                    <a:pt x="1720309" y="625943"/>
-                    <a:pt x="1752137" y="594840"/>
-                    <a:pt x="1791923" y="594840"/>
-                  </a:cubicBezTo>
-                  <a:cubicBezTo>
-                    <a:pt x="1830912" y="594840"/>
-                    <a:pt x="1863536" y="626720"/>
-                    <a:pt x="1863536" y="664821"/>
-                  </a:cubicBezTo>
-                  <a:close/>
-                  <a:moveTo>
-                    <a:pt x="1180823" y="1812513"/>
-                  </a:moveTo>
-                  <a:lnTo>
-                    <a:pt x="1164113" y="1796184"/>
-                  </a:lnTo>
-                  <a:lnTo>
-                    <a:pt x="1265167" y="1697433"/>
-                  </a:lnTo>
-                  <a:lnTo>
-                    <a:pt x="1281877" y="1713762"/>
-                  </a:lnTo>
-                  <a:lnTo>
-                    <a:pt x="1180823" y="1812513"/>
-                  </a:lnTo>
-                  <a:close/>
-                  <a:moveTo>
-                    <a:pt x="82753" y="1819511"/>
-                  </a:moveTo>
-                  <a:lnTo>
-                    <a:pt x="58882" y="1819511"/>
-                  </a:lnTo>
-                  <a:lnTo>
-                    <a:pt x="58882" y="1679549"/>
-                  </a:lnTo>
-                  <a:lnTo>
-                    <a:pt x="82753" y="1679549"/>
-                  </a:lnTo>
-                  <a:lnTo>
-                    <a:pt x="82753" y="1819511"/>
-                  </a:lnTo>
-                  <a:close/>
-                  <a:moveTo>
-                    <a:pt x="1803062" y="2379361"/>
-                  </a:moveTo>
-                  <a:lnTo>
-                    <a:pt x="1779191" y="2379361"/>
-                  </a:lnTo>
-                  <a:lnTo>
-                    <a:pt x="1779191" y="2239399"/>
-                  </a:lnTo>
-                  <a:lnTo>
-                    <a:pt x="1803062" y="2239399"/>
-                  </a:lnTo>
-                  <a:lnTo>
-                    <a:pt x="1803062" y="2379361"/>
-                  </a:lnTo>
-                  <a:close/>
-                  <a:moveTo>
-                    <a:pt x="143226" y="2344370"/>
-                  </a:moveTo>
-                  <a:lnTo>
-                    <a:pt x="119355" y="2344370"/>
-                  </a:lnTo>
-                  <a:cubicBezTo>
-                    <a:pt x="119355" y="2318711"/>
-                    <a:pt x="97871" y="2297716"/>
-                    <a:pt x="71613" y="2297716"/>
-                  </a:cubicBezTo>
-                  <a:cubicBezTo>
-                    <a:pt x="45355" y="2297716"/>
-                    <a:pt x="23871" y="2318711"/>
-                    <a:pt x="23871" y="2344370"/>
-                  </a:cubicBezTo>
-                  <a:lnTo>
-                    <a:pt x="0" y="2344370"/>
-                  </a:lnTo>
-                  <a:cubicBezTo>
-                    <a:pt x="0" y="2305492"/>
-                    <a:pt x="31828" y="2274389"/>
-                    <a:pt x="71613" y="2274389"/>
-                  </a:cubicBezTo>
-                  <a:cubicBezTo>
-                    <a:pt x="111398" y="2274389"/>
-                    <a:pt x="143226" y="2305492"/>
-                    <a:pt x="143226" y="2344370"/>
-                  </a:cubicBezTo>
-                  <a:close/>
-                  <a:moveTo>
-                    <a:pt x="2322656" y="127521"/>
-                  </a:moveTo>
-                  <a:lnTo>
-                    <a:pt x="2305946" y="111192"/>
-                  </a:lnTo>
-                  <a:lnTo>
-                    <a:pt x="2407001" y="12441"/>
-                  </a:lnTo>
-                  <a:lnTo>
-                    <a:pt x="2423710" y="28770"/>
-                  </a:lnTo>
-                  <a:lnTo>
-                    <a:pt x="2322656" y="127521"/>
-                  </a:lnTo>
-                  <a:close/>
-                  <a:moveTo>
-                    <a:pt x="601551" y="2370030"/>
-                  </a:moveTo>
-                  <a:lnTo>
-                    <a:pt x="584841" y="2353701"/>
-                  </a:lnTo>
-                  <a:lnTo>
-                    <a:pt x="685896" y="2254950"/>
-                  </a:lnTo>
-                  <a:lnTo>
-                    <a:pt x="702605" y="2271279"/>
-                  </a:lnTo>
-                  <a:lnTo>
-                    <a:pt x="601551" y="2370030"/>
-                  </a:lnTo>
-                  <a:close/>
-                  <a:moveTo>
-                    <a:pt x="1746567" y="1249553"/>
-                  </a:moveTo>
-                  <a:lnTo>
-                    <a:pt x="1729858" y="1233224"/>
-                  </a:lnTo>
-                  <a:lnTo>
-                    <a:pt x="1830912" y="1134473"/>
-                  </a:lnTo>
-                  <a:lnTo>
-                    <a:pt x="1847622" y="1150802"/>
-                  </a:lnTo>
-                  <a:lnTo>
-                    <a:pt x="1746567" y="1249553"/>
-                  </a:lnTo>
-                  <a:close/>
-                  <a:moveTo>
-                    <a:pt x="573701" y="1154690"/>
-                  </a:moveTo>
-                  <a:lnTo>
-                    <a:pt x="597573" y="1154690"/>
-                  </a:lnTo>
-                  <a:cubicBezTo>
-                    <a:pt x="597573" y="1180350"/>
-                    <a:pt x="619056" y="1201344"/>
-                    <a:pt x="645315" y="1201344"/>
-                  </a:cubicBezTo>
-                  <a:cubicBezTo>
-                    <a:pt x="671573" y="1201344"/>
-                    <a:pt x="693057" y="1180350"/>
-                    <a:pt x="693057" y="1154690"/>
-                  </a:cubicBezTo>
-                  <a:lnTo>
-                    <a:pt x="716928" y="1154690"/>
-                  </a:lnTo>
-                  <a:cubicBezTo>
-                    <a:pt x="716928" y="1193568"/>
-                    <a:pt x="685100" y="1224671"/>
-                    <a:pt x="645315" y="1224671"/>
-                  </a:cubicBezTo>
-                  <a:cubicBezTo>
-                    <a:pt x="606325" y="1224671"/>
-                    <a:pt x="573701" y="1193568"/>
-                    <a:pt x="573701" y="1154690"/>
-                  </a:cubicBezTo>
-                  <a:close/>
-                  <a:moveTo>
-                    <a:pt x="1863536" y="1783743"/>
-                  </a:moveTo>
-                  <a:lnTo>
-                    <a:pt x="1839665" y="1783743"/>
-                  </a:lnTo>
-                  <a:cubicBezTo>
-                    <a:pt x="1839665" y="1758083"/>
-                    <a:pt x="1818181" y="1737089"/>
-                    <a:pt x="1791923" y="1737089"/>
-                  </a:cubicBezTo>
-                  <a:cubicBezTo>
-                    <a:pt x="1765664" y="1737089"/>
-                    <a:pt x="1744180" y="1758083"/>
-                    <a:pt x="1744180" y="1783743"/>
-                  </a:cubicBezTo>
-                  <a:lnTo>
-                    <a:pt x="1720309" y="1783743"/>
-                  </a:lnTo>
-                  <a:cubicBezTo>
-                    <a:pt x="1720309" y="1744865"/>
-                    <a:pt x="1752137" y="1713762"/>
-                    <a:pt x="1791923" y="1713762"/>
-                  </a:cubicBezTo>
-                  <a:cubicBezTo>
-                    <a:pt x="1831708" y="1713762"/>
-                    <a:pt x="1863536" y="1745642"/>
-                    <a:pt x="1863536" y="1783743"/>
-                  </a:cubicBezTo>
-                  <a:close/>
-                </a:path>
-              </a:pathLst>
-            </a:custGeom>
-            <a:solidFill>
-              <a:srgbClr val="2ED47B"/>
-            </a:solidFill>
-          </p:spPr>
-        </p:sp>
-      </p:grpSp>
-      <p:grpSp>
-        <p:nvGrpSpPr>
-          <p:cNvPr name="Group 6" id="6"/>
-          <p:cNvGrpSpPr/>
-          <p:nvPr/>
-        </p:nvGrpSpPr>
-        <p:grpSpPr>
-          <a:xfrm rot="0">
-            <a:off x="4277938" y="5945392"/>
-            <a:ext cx="2912577" cy="2839113"/>
-            <a:chOff x="0" y="0"/>
-            <a:chExt cx="4589780" cy="4578350"/>
-          </a:xfrm>
-        </p:grpSpPr>
-        <p:sp>
-          <p:nvSpPr>
-            <p:cNvPr name="Freeform 7" id="7"/>
-            <p:cNvSpPr/>
-            <p:nvPr/>
-          </p:nvSpPr>
-          <p:spPr>
-            <a:xfrm>
-              <a:off x="232345" y="209944"/>
-              <a:ext cx="2418937" cy="2345148"/>
-            </a:xfrm>
-            <a:custGeom>
-              <a:avLst/>
-              <a:gdLst/>
-              <a:ahLst/>
-              <a:cxnLst/>
-              <a:rect r="r" b="b" t="t" l="l"/>
-              <a:pathLst>
-                <a:path h="2345148" w="2418937">
-                  <a:moveTo>
-                    <a:pt x="20688" y="139962"/>
-                  </a:moveTo>
-                  <a:lnTo>
-                    <a:pt x="20688" y="116635"/>
-                  </a:lnTo>
-                  <a:cubicBezTo>
-                    <a:pt x="46947" y="116635"/>
-                    <a:pt x="68431" y="95641"/>
-                    <a:pt x="68431" y="69981"/>
-                  </a:cubicBezTo>
-                  <a:cubicBezTo>
-                    <a:pt x="68431" y="44321"/>
-                    <a:pt x="46947" y="23327"/>
-                    <a:pt x="20688" y="23327"/>
-                  </a:cubicBezTo>
-                  <a:lnTo>
-                    <a:pt x="20688" y="0"/>
-                  </a:lnTo>
-                  <a:cubicBezTo>
-                    <a:pt x="60474" y="0"/>
-                    <a:pt x="92302" y="31102"/>
-                    <a:pt x="92302" y="69981"/>
-                  </a:cubicBezTo>
-                  <a:cubicBezTo>
-                    <a:pt x="92302" y="108859"/>
-                    <a:pt x="60474" y="139962"/>
-                    <a:pt x="20688" y="139962"/>
-                  </a:cubicBezTo>
-                  <a:close/>
-                  <a:moveTo>
-                    <a:pt x="1273125" y="80867"/>
-                  </a:moveTo>
-                  <a:lnTo>
-                    <a:pt x="1273125" y="57540"/>
-                  </a:lnTo>
-                  <a:lnTo>
-                    <a:pt x="1129898" y="57540"/>
-                  </a:lnTo>
-                  <a:lnTo>
-                    <a:pt x="1129898" y="80867"/>
-                  </a:lnTo>
-                  <a:lnTo>
-                    <a:pt x="1273125" y="80867"/>
-                  </a:lnTo>
-                  <a:close/>
-                  <a:moveTo>
-                    <a:pt x="1201511" y="2345148"/>
-                  </a:moveTo>
-                  <a:cubicBezTo>
-                    <a:pt x="1241297" y="2345148"/>
-                    <a:pt x="1273125" y="2314045"/>
-                    <a:pt x="1273125" y="2275167"/>
-                  </a:cubicBezTo>
-                  <a:lnTo>
-                    <a:pt x="1249254" y="2275167"/>
-                  </a:lnTo>
-                  <a:cubicBezTo>
-                    <a:pt x="1249254" y="2300827"/>
-                    <a:pt x="1227770" y="2321821"/>
-                    <a:pt x="1201511" y="2321821"/>
-                  </a:cubicBezTo>
-                  <a:cubicBezTo>
-                    <a:pt x="1175253" y="2321821"/>
-                    <a:pt x="1153769" y="2300827"/>
-                    <a:pt x="1153769" y="2275167"/>
-                  </a:cubicBezTo>
-                  <a:lnTo>
-                    <a:pt x="1129898" y="2275167"/>
-                  </a:lnTo>
-                  <a:cubicBezTo>
-                    <a:pt x="1129898" y="2313268"/>
-                    <a:pt x="1161726" y="2345148"/>
-                    <a:pt x="1201511" y="2345148"/>
-                  </a:cubicBezTo>
-                  <a:close/>
-                  <a:moveTo>
-                    <a:pt x="592799" y="1748753"/>
-                  </a:moveTo>
-                  <a:cubicBezTo>
-                    <a:pt x="592799" y="1787631"/>
-                    <a:pt x="624627" y="1818734"/>
-                    <a:pt x="664412" y="1818734"/>
-                  </a:cubicBezTo>
-                  <a:lnTo>
-                    <a:pt x="664412" y="1795407"/>
-                  </a:lnTo>
-                  <a:cubicBezTo>
-                    <a:pt x="638154" y="1795407"/>
-                    <a:pt x="616670" y="1774412"/>
-                    <a:pt x="616670" y="1748753"/>
-                  </a:cubicBezTo>
-                  <a:cubicBezTo>
-                    <a:pt x="616670" y="1723093"/>
-                    <a:pt x="638154" y="1702098"/>
-                    <a:pt x="664412" y="1702098"/>
-                  </a:cubicBezTo>
-                  <a:lnTo>
-                    <a:pt x="664412" y="1678771"/>
-                  </a:lnTo>
-                  <a:cubicBezTo>
-                    <a:pt x="625423" y="1678771"/>
-                    <a:pt x="592799" y="1710652"/>
-                    <a:pt x="592799" y="1748753"/>
-                  </a:cubicBezTo>
-                  <a:close/>
-                  <a:moveTo>
-                    <a:pt x="101054" y="1245665"/>
-                  </a:moveTo>
-                  <a:lnTo>
-                    <a:pt x="117764" y="1228559"/>
-                  </a:lnTo>
-                  <a:lnTo>
-                    <a:pt x="16710" y="1129808"/>
-                  </a:lnTo>
-                  <a:lnTo>
-                    <a:pt x="0" y="1146137"/>
-                  </a:lnTo>
-                  <a:lnTo>
-                    <a:pt x="101054" y="1245665"/>
-                  </a:lnTo>
-                  <a:close/>
-                  <a:moveTo>
-                    <a:pt x="2418937" y="644604"/>
-                  </a:moveTo>
-                  <a:lnTo>
-                    <a:pt x="2418937" y="621277"/>
-                  </a:lnTo>
-                  <a:lnTo>
-                    <a:pt x="2275710" y="621277"/>
-                  </a:lnTo>
-                  <a:lnTo>
-                    <a:pt x="2275710" y="644604"/>
-                  </a:lnTo>
-                  <a:lnTo>
-                    <a:pt x="2418937" y="644604"/>
-                  </a:lnTo>
-                  <a:close/>
-                  <a:moveTo>
-                    <a:pt x="2311517" y="1192013"/>
-                  </a:moveTo>
-                  <a:cubicBezTo>
-                    <a:pt x="2311517" y="1230892"/>
-                    <a:pt x="2343345" y="1261994"/>
-                    <a:pt x="2383130" y="1261994"/>
-                  </a:cubicBezTo>
-                  <a:lnTo>
-                    <a:pt x="2383130" y="1238667"/>
-                  </a:lnTo>
-                  <a:cubicBezTo>
-                    <a:pt x="2356872" y="1238667"/>
-                    <a:pt x="2335388" y="1217673"/>
-                    <a:pt x="2335388" y="1192013"/>
-                  </a:cubicBezTo>
-                  <a:cubicBezTo>
-                    <a:pt x="2335388" y="1166353"/>
-                    <a:pt x="2356872" y="1145359"/>
-                    <a:pt x="2383130" y="1145359"/>
-                  </a:cubicBezTo>
-                  <a:lnTo>
-                    <a:pt x="2383130" y="1122032"/>
-                  </a:lnTo>
-                  <a:cubicBezTo>
-                    <a:pt x="2344141" y="1122032"/>
-                    <a:pt x="2311517" y="1153135"/>
-                    <a:pt x="2311517" y="1192013"/>
-                  </a:cubicBezTo>
-                  <a:close/>
-                  <a:moveTo>
-                    <a:pt x="1235727" y="630608"/>
-                  </a:moveTo>
-                  <a:cubicBezTo>
-                    <a:pt x="1235727" y="591730"/>
-                    <a:pt x="1203899" y="560627"/>
-                    <a:pt x="1164113" y="560627"/>
-                  </a:cubicBezTo>
-                  <a:lnTo>
-                    <a:pt x="1164113" y="583954"/>
-                  </a:lnTo>
-                  <a:cubicBezTo>
-                    <a:pt x="1190372" y="583954"/>
-                    <a:pt x="1211856" y="604948"/>
-                    <a:pt x="1211856" y="630608"/>
-                  </a:cubicBezTo>
-                  <a:cubicBezTo>
-                    <a:pt x="1211856" y="656268"/>
-                    <a:pt x="1190372" y="677262"/>
-                    <a:pt x="1164113" y="677262"/>
-                  </a:cubicBezTo>
-                  <a:lnTo>
-                    <a:pt x="1164113" y="700589"/>
-                  </a:lnTo>
-                  <a:cubicBezTo>
-                    <a:pt x="1203899" y="700589"/>
-                    <a:pt x="1235727" y="668709"/>
-                    <a:pt x="1235727" y="630608"/>
-                  </a:cubicBezTo>
-                  <a:close/>
-                  <a:moveTo>
-                    <a:pt x="639745" y="559072"/>
-                  </a:moveTo>
-                  <a:lnTo>
-                    <a:pt x="615874" y="559072"/>
-                  </a:lnTo>
-                  <a:lnTo>
-                    <a:pt x="615874" y="699034"/>
-                  </a:lnTo>
-                  <a:lnTo>
-                    <a:pt x="639745" y="699034"/>
-                  </a:lnTo>
-                  <a:lnTo>
-                    <a:pt x="639745" y="559072"/>
-                  </a:lnTo>
-                  <a:close/>
-                  <a:moveTo>
-                    <a:pt x="1272329" y="1201344"/>
-                  </a:moveTo>
-                  <a:lnTo>
-                    <a:pt x="1272329" y="1178017"/>
-                  </a:lnTo>
-                  <a:lnTo>
-                    <a:pt x="1129103" y="1178017"/>
-                  </a:lnTo>
-                  <a:lnTo>
-                    <a:pt x="1129103" y="1201344"/>
-                  </a:lnTo>
-                  <a:lnTo>
-                    <a:pt x="1272329" y="1201344"/>
-                  </a:lnTo>
-                  <a:close/>
-                  <a:moveTo>
-                    <a:pt x="2418937" y="2320266"/>
-                  </a:moveTo>
-                  <a:lnTo>
-                    <a:pt x="2418937" y="2296939"/>
-                  </a:lnTo>
-                  <a:lnTo>
-                    <a:pt x="2275710" y="2296939"/>
-                  </a:lnTo>
-                  <a:lnTo>
-                    <a:pt x="2275710" y="2320266"/>
-                  </a:lnTo>
-                  <a:lnTo>
-                    <a:pt x="2418937" y="2320266"/>
-                  </a:lnTo>
-                  <a:close/>
-                </a:path>
-              </a:pathLst>
-            </a:custGeom>
-            <a:solidFill>
-              <a:srgbClr val="383838"/>
-            </a:solidFill>
-          </p:spPr>
-        </p:sp>
-        <p:sp>
-          <p:nvSpPr>
-            <p:cNvPr name="Freeform 8" id="8"/>
-            <p:cNvSpPr/>
-            <p:nvPr/>
-          </p:nvSpPr>
-          <p:spPr>
-            <a:xfrm>
-              <a:off x="214840" y="209944"/>
-              <a:ext cx="2423711" cy="2379361"/>
-            </a:xfrm>
-            <a:custGeom>
-              <a:avLst/>
-              <a:gdLst/>
-              <a:ahLst/>
-              <a:cxnLst/>
-              <a:rect r="r" b="b" t="t" l="l"/>
-              <a:pathLst>
-                <a:path h="2379361" w="2423711">
-                  <a:moveTo>
-                    <a:pt x="2376764" y="1820289"/>
-                  </a:moveTo>
-                  <a:lnTo>
-                    <a:pt x="2352893" y="1820289"/>
-                  </a:lnTo>
-                  <a:lnTo>
-                    <a:pt x="2352893" y="1680326"/>
-                  </a:lnTo>
-                  <a:lnTo>
-                    <a:pt x="2376764" y="1680326"/>
-                  </a:lnTo>
-                  <a:lnTo>
-                    <a:pt x="2376764" y="1820289"/>
-                  </a:lnTo>
-                  <a:close/>
-                  <a:moveTo>
-                    <a:pt x="657250" y="0"/>
-                  </a:moveTo>
-                  <a:lnTo>
-                    <a:pt x="633379" y="0"/>
-                  </a:lnTo>
-                  <a:lnTo>
-                    <a:pt x="633379" y="139962"/>
-                  </a:lnTo>
-                  <a:lnTo>
-                    <a:pt x="657250" y="139962"/>
-                  </a:lnTo>
-                  <a:lnTo>
-                    <a:pt x="657250" y="0"/>
-                  </a:lnTo>
-                  <a:close/>
-                  <a:moveTo>
-                    <a:pt x="33419" y="690481"/>
-                  </a:moveTo>
-                  <a:lnTo>
-                    <a:pt x="16710" y="674152"/>
-                  </a:lnTo>
-                  <a:lnTo>
-                    <a:pt x="117764" y="575401"/>
-                  </a:lnTo>
-                  <a:lnTo>
-                    <a:pt x="134474" y="591730"/>
-                  </a:lnTo>
-                  <a:lnTo>
-                    <a:pt x="33419" y="690481"/>
-                  </a:lnTo>
-                  <a:close/>
-                  <a:moveTo>
-                    <a:pt x="1729858" y="27992"/>
-                  </a:moveTo>
-                  <a:lnTo>
-                    <a:pt x="1746567" y="11663"/>
-                  </a:lnTo>
-                  <a:lnTo>
-                    <a:pt x="1847622" y="110414"/>
-                  </a:lnTo>
-                  <a:lnTo>
-                    <a:pt x="1830912" y="126743"/>
-                  </a:lnTo>
-                  <a:lnTo>
-                    <a:pt x="1729858" y="27992"/>
-                  </a:lnTo>
-                  <a:close/>
-                  <a:moveTo>
-                    <a:pt x="1863536" y="664821"/>
-                  </a:moveTo>
-                  <a:lnTo>
-                    <a:pt x="1839665" y="664821"/>
-                  </a:lnTo>
-                  <a:cubicBezTo>
-                    <a:pt x="1839665" y="639161"/>
-                    <a:pt x="1818181" y="618167"/>
-                    <a:pt x="1791923" y="618167"/>
-                  </a:cubicBezTo>
-                  <a:cubicBezTo>
-                    <a:pt x="1765664" y="618167"/>
-                    <a:pt x="1744180" y="639161"/>
-                    <a:pt x="1744180" y="664821"/>
-                  </a:cubicBezTo>
-                  <a:lnTo>
-                    <a:pt x="1720309" y="664821"/>
-                  </a:lnTo>
-                  <a:cubicBezTo>
-                    <a:pt x="1720309" y="625943"/>
-                    <a:pt x="1752137" y="594840"/>
-                    <a:pt x="1791923" y="594840"/>
-                  </a:cubicBezTo>
-                  <a:cubicBezTo>
-                    <a:pt x="1830912" y="594840"/>
-                    <a:pt x="1863536" y="626720"/>
-                    <a:pt x="1863536" y="664821"/>
-                  </a:cubicBezTo>
-                  <a:close/>
-                  <a:moveTo>
-                    <a:pt x="1180823" y="1812513"/>
-                  </a:moveTo>
-                  <a:lnTo>
-                    <a:pt x="1164113" y="1796184"/>
-                  </a:lnTo>
-                  <a:lnTo>
-                    <a:pt x="1265167" y="1697433"/>
-                  </a:lnTo>
-                  <a:lnTo>
-                    <a:pt x="1281877" y="1713762"/>
-                  </a:lnTo>
-                  <a:lnTo>
-                    <a:pt x="1180823" y="1812513"/>
-                  </a:lnTo>
-                  <a:close/>
-                  <a:moveTo>
-                    <a:pt x="82753" y="1819511"/>
-                  </a:moveTo>
-                  <a:lnTo>
-                    <a:pt x="58882" y="1819511"/>
-                  </a:lnTo>
-                  <a:lnTo>
-                    <a:pt x="58882" y="1679549"/>
-                  </a:lnTo>
-                  <a:lnTo>
-                    <a:pt x="82753" y="1679549"/>
-                  </a:lnTo>
-                  <a:lnTo>
-                    <a:pt x="82753" y="1819511"/>
-                  </a:lnTo>
-                  <a:close/>
-                  <a:moveTo>
-                    <a:pt x="1803062" y="2379361"/>
-                  </a:moveTo>
-                  <a:lnTo>
-                    <a:pt x="1779191" y="2379361"/>
-                  </a:lnTo>
-                  <a:lnTo>
-                    <a:pt x="1779191" y="2239399"/>
-                  </a:lnTo>
-                  <a:lnTo>
-                    <a:pt x="1803062" y="2239399"/>
-                  </a:lnTo>
-                  <a:lnTo>
-                    <a:pt x="1803062" y="2379361"/>
-                  </a:lnTo>
-                  <a:close/>
-                  <a:moveTo>
-                    <a:pt x="143226" y="2344370"/>
-                  </a:moveTo>
-                  <a:lnTo>
-                    <a:pt x="119355" y="2344370"/>
-                  </a:lnTo>
-                  <a:cubicBezTo>
-                    <a:pt x="119355" y="2318711"/>
-                    <a:pt x="97871" y="2297716"/>
-                    <a:pt x="71613" y="2297716"/>
-                  </a:cubicBezTo>
-                  <a:cubicBezTo>
-                    <a:pt x="45355" y="2297716"/>
-                    <a:pt x="23871" y="2318711"/>
-                    <a:pt x="23871" y="2344370"/>
-                  </a:cubicBezTo>
-                  <a:lnTo>
-                    <a:pt x="0" y="2344370"/>
-                  </a:lnTo>
-                  <a:cubicBezTo>
-                    <a:pt x="0" y="2305492"/>
-                    <a:pt x="31828" y="2274389"/>
-                    <a:pt x="71613" y="2274389"/>
-                  </a:cubicBezTo>
-                  <a:cubicBezTo>
-                    <a:pt x="111398" y="2274389"/>
-                    <a:pt x="143226" y="2305492"/>
-                    <a:pt x="143226" y="2344370"/>
-                  </a:cubicBezTo>
-                  <a:close/>
-                  <a:moveTo>
-                    <a:pt x="2322656" y="127521"/>
-                  </a:moveTo>
-                  <a:lnTo>
-                    <a:pt x="2305946" y="111192"/>
-                  </a:lnTo>
-                  <a:lnTo>
-                    <a:pt x="2407001" y="12441"/>
-                  </a:lnTo>
-                  <a:lnTo>
-                    <a:pt x="2423710" y="28770"/>
-                  </a:lnTo>
-                  <a:lnTo>
-                    <a:pt x="2322656" y="127521"/>
-                  </a:lnTo>
-                  <a:close/>
-                  <a:moveTo>
-                    <a:pt x="601551" y="2370030"/>
-                  </a:moveTo>
-                  <a:lnTo>
-                    <a:pt x="584841" y="2353701"/>
-                  </a:lnTo>
-                  <a:lnTo>
-                    <a:pt x="685896" y="2254950"/>
-                  </a:lnTo>
-                  <a:lnTo>
-                    <a:pt x="702605" y="2271279"/>
-                  </a:lnTo>
-                  <a:lnTo>
-                    <a:pt x="601551" y="2370030"/>
-                  </a:lnTo>
-                  <a:close/>
-                  <a:moveTo>
-                    <a:pt x="1746567" y="1249553"/>
-                  </a:moveTo>
-                  <a:lnTo>
-                    <a:pt x="1729858" y="1233224"/>
-                  </a:lnTo>
-                  <a:lnTo>
-                    <a:pt x="1830912" y="1134473"/>
-                  </a:lnTo>
-                  <a:lnTo>
-                    <a:pt x="1847622" y="1150802"/>
-                  </a:lnTo>
-                  <a:lnTo>
-                    <a:pt x="1746567" y="1249553"/>
-                  </a:lnTo>
-                  <a:close/>
-                  <a:moveTo>
-                    <a:pt x="573701" y="1154690"/>
-                  </a:moveTo>
-                  <a:lnTo>
-                    <a:pt x="597573" y="1154690"/>
-                  </a:lnTo>
-                  <a:cubicBezTo>
-                    <a:pt x="597573" y="1180350"/>
-                    <a:pt x="619056" y="1201344"/>
-                    <a:pt x="645315" y="1201344"/>
-                  </a:cubicBezTo>
-                  <a:cubicBezTo>
-                    <a:pt x="671573" y="1201344"/>
-                    <a:pt x="693057" y="1180350"/>
-                    <a:pt x="693057" y="1154690"/>
-                  </a:cubicBezTo>
-                  <a:lnTo>
-                    <a:pt x="716928" y="1154690"/>
-                  </a:lnTo>
-                  <a:cubicBezTo>
-                    <a:pt x="716928" y="1193568"/>
-                    <a:pt x="685100" y="1224671"/>
-                    <a:pt x="645315" y="1224671"/>
-                  </a:cubicBezTo>
-                  <a:cubicBezTo>
-                    <a:pt x="606325" y="1224671"/>
-                    <a:pt x="573701" y="1193568"/>
-                    <a:pt x="573701" y="1154690"/>
-                  </a:cubicBezTo>
-                  <a:close/>
-                  <a:moveTo>
-                    <a:pt x="1863536" y="1783743"/>
-                  </a:moveTo>
-                  <a:lnTo>
-                    <a:pt x="1839665" y="1783743"/>
-                  </a:lnTo>
-                  <a:cubicBezTo>
-                    <a:pt x="1839665" y="1758083"/>
-                    <a:pt x="1818181" y="1737089"/>
-                    <a:pt x="1791923" y="1737089"/>
-                  </a:cubicBezTo>
-                  <a:cubicBezTo>
-                    <a:pt x="1765664" y="1737089"/>
-                    <a:pt x="1744180" y="1758083"/>
-                    <a:pt x="1744180" y="1783743"/>
-                  </a:cubicBezTo>
-                  <a:lnTo>
-                    <a:pt x="1720309" y="1783743"/>
-                  </a:lnTo>
-                  <a:cubicBezTo>
-                    <a:pt x="1720309" y="1744865"/>
-                    <a:pt x="1752137" y="1713762"/>
-                    <a:pt x="1791923" y="1713762"/>
-                  </a:cubicBezTo>
-                  <a:cubicBezTo>
-                    <a:pt x="1831708" y="1713762"/>
-                    <a:pt x="1863536" y="1745642"/>
-                    <a:pt x="1863536" y="1783743"/>
-                  </a:cubicBezTo>
-                  <a:close/>
-                </a:path>
-              </a:pathLst>
-            </a:custGeom>
-            <a:solidFill>
-              <a:srgbClr val="2ED47B"/>
-            </a:solidFill>
-          </p:spPr>
-        </p:sp>
-      </p:grpSp>
-      <p:pic>
-        <p:nvPicPr>
-          <p:cNvPr name="Picture 9" id="9"/>
-          <p:cNvPicPr>
-            <a:picLocks noChangeAspect="true"/>
-          </p:cNvPicPr>
-          <p:nvPr/>
-        </p:nvPicPr>
-        <p:blipFill>
-          <a:blip r:embed="rId2"/>
-          <a:srcRect l="0" t="0" r="0" b="0"/>
-          <a:stretch>
-            <a:fillRect/>
-          </a:stretch>
-        </p:blipFill>
-        <p:spPr>
-          <a:xfrm flipH="false" flipV="false" rot="0">
-            <a:off x="6134258" y="2615317"/>
-            <a:ext cx="6019484" cy="5056367"/>
-          </a:xfrm>
-          <a:prstGeom prst="rect">
-            <a:avLst/>
-          </a:prstGeom>
-        </p:spPr>
-      </p:pic>
       <p:sp>
         <p:nvSpPr>
-          <p:cNvPr name="TextBox 10" id="10"/>
+          <p:cNvPr name="TextBox 14" id="14"/>
           <p:cNvSpPr txBox="true"/>
           <p:nvPr/>
         </p:nvSpPr>
@@ -11654,7 +11961,7 @@
       </p:sp>
       <p:sp>
         <p:nvSpPr>
-          <p:cNvPr name="TextBox 11" id="11"/>
+          <p:cNvPr name="TextBox 15" id="15"/>
           <p:cNvSpPr txBox="true"/>
           <p:nvPr/>
         </p:nvSpPr>
@@ -11695,7 +12002,7 @@
       </p:sp>
       <p:sp>
         <p:nvSpPr>
-          <p:cNvPr name="TextBox 12" id="12"/>
+          <p:cNvPr name="TextBox 16" id="16"/>
           <p:cNvSpPr txBox="true"/>
           <p:nvPr/>
         </p:nvSpPr>
@@ -11736,7 +12043,7 @@
       </p:sp>
       <p:sp>
         <p:nvSpPr>
-          <p:cNvPr name="TextBox 13" id="13"/>
+          <p:cNvPr name="TextBox 17" id="17"/>
           <p:cNvSpPr txBox="true"/>
           <p:nvPr/>
         </p:nvSpPr>
@@ -11777,7 +12084,7 @@
       </p:sp>
       <p:sp>
         <p:nvSpPr>
-          <p:cNvPr name="TextBox 14" id="14"/>
+          <p:cNvPr name="TextBox 18" id="18"/>
           <p:cNvSpPr txBox="true"/>
           <p:nvPr/>
         </p:nvSpPr>
@@ -11818,7 +12125,7 @@
       </p:sp>
       <p:sp>
         <p:nvSpPr>
-          <p:cNvPr name="TextBox 15" id="15"/>
+          <p:cNvPr name="TextBox 19" id="19"/>
           <p:cNvSpPr txBox="true"/>
           <p:nvPr/>
         </p:nvSpPr>
@@ -11857,148 +12164,6 @@
           </a:p>
         </p:txBody>
       </p:sp>
-      <p:grpSp>
-        <p:nvGrpSpPr>
-          <p:cNvPr name="Group 16" id="16"/>
-          <p:cNvGrpSpPr/>
-          <p:nvPr/>
-        </p:nvGrpSpPr>
-        <p:grpSpPr>
-          <a:xfrm rot="0">
-            <a:off x="-2897619" y="7671683"/>
-            <a:ext cx="6216356" cy="6216356"/>
-            <a:chOff x="0" y="0"/>
-            <a:chExt cx="6350000" cy="6350000"/>
-          </a:xfrm>
-        </p:grpSpPr>
-        <p:sp>
-          <p:nvSpPr>
-            <p:cNvPr name="Freeform 17" id="17"/>
-            <p:cNvSpPr/>
-            <p:nvPr/>
-          </p:nvSpPr>
-          <p:spPr>
-            <a:xfrm>
-              <a:off x="14167" y="0"/>
-              <a:ext cx="6321665" cy="6350000"/>
-            </a:xfrm>
-            <a:custGeom>
-              <a:avLst/>
-              <a:gdLst/>
-              <a:ahLst/>
-              <a:cxnLst/>
-              <a:rect r="r" b="b" t="t" l="l"/>
-              <a:pathLst>
-                <a:path h="6350000" w="6321665">
-                  <a:moveTo>
-                    <a:pt x="3160833" y="0"/>
-                  </a:moveTo>
-                  <a:lnTo>
-                    <a:pt x="3160833" y="0"/>
-                  </a:lnTo>
-                  <a:cubicBezTo>
-                    <a:pt x="4908795" y="7817"/>
-                    <a:pt x="6321666" y="1427021"/>
-                    <a:pt x="6321666" y="3175000"/>
-                  </a:cubicBezTo>
-                  <a:cubicBezTo>
-                    <a:pt x="6321666" y="4922979"/>
-                    <a:pt x="4908795" y="6342183"/>
-                    <a:pt x="3160833" y="6350000"/>
-                  </a:cubicBezTo>
-                  <a:cubicBezTo>
-                    <a:pt x="1412871" y="6342183"/>
-                    <a:pt x="0" y="4922979"/>
-                    <a:pt x="0" y="3175000"/>
-                  </a:cubicBezTo>
-                  <a:cubicBezTo>
-                    <a:pt x="0" y="1427021"/>
-                    <a:pt x="1412871" y="7817"/>
-                    <a:pt x="3160833" y="0"/>
-                  </a:cubicBezTo>
-                  <a:close/>
-                </a:path>
-              </a:pathLst>
-            </a:custGeom>
-            <a:solidFill>
-              <a:srgbClr val="242725">
-                <a:alpha val="4705"/>
-              </a:srgbClr>
-            </a:solidFill>
-          </p:spPr>
-        </p:sp>
-      </p:grpSp>
-      <p:grpSp>
-        <p:nvGrpSpPr>
-          <p:cNvPr name="Group 18" id="18"/>
-          <p:cNvGrpSpPr/>
-          <p:nvPr/>
-        </p:nvGrpSpPr>
-        <p:grpSpPr>
-          <a:xfrm rot="0">
-            <a:off x="15173159" y="-3763194"/>
-            <a:ext cx="6216356" cy="6216356"/>
-            <a:chOff x="0" y="0"/>
-            <a:chExt cx="6350000" cy="6350000"/>
-          </a:xfrm>
-        </p:grpSpPr>
-        <p:sp>
-          <p:nvSpPr>
-            <p:cNvPr name="Freeform 19" id="19"/>
-            <p:cNvSpPr/>
-            <p:nvPr/>
-          </p:nvSpPr>
-          <p:spPr>
-            <a:xfrm>
-              <a:off x="14167" y="0"/>
-              <a:ext cx="6321665" cy="6350000"/>
-            </a:xfrm>
-            <a:custGeom>
-              <a:avLst/>
-              <a:gdLst/>
-              <a:ahLst/>
-              <a:cxnLst/>
-              <a:rect r="r" b="b" t="t" l="l"/>
-              <a:pathLst>
-                <a:path h="6350000" w="6321665">
-                  <a:moveTo>
-                    <a:pt x="3160833" y="0"/>
-                  </a:moveTo>
-                  <a:lnTo>
-                    <a:pt x="3160833" y="0"/>
-                  </a:lnTo>
-                  <a:cubicBezTo>
-                    <a:pt x="4908795" y="7817"/>
-                    <a:pt x="6321666" y="1427021"/>
-                    <a:pt x="6321666" y="3175000"/>
-                  </a:cubicBezTo>
-                  <a:cubicBezTo>
-                    <a:pt x="6321666" y="4922979"/>
-                    <a:pt x="4908795" y="6342183"/>
-                    <a:pt x="3160833" y="6350000"/>
-                  </a:cubicBezTo>
-                  <a:cubicBezTo>
-                    <a:pt x="1412871" y="6342183"/>
-                    <a:pt x="0" y="4922979"/>
-                    <a:pt x="0" y="3175000"/>
-                  </a:cubicBezTo>
-                  <a:cubicBezTo>
-                    <a:pt x="0" y="1427021"/>
-                    <a:pt x="1412871" y="7817"/>
-                    <a:pt x="3160833" y="0"/>
-                  </a:cubicBezTo>
-                  <a:close/>
-                </a:path>
-              </a:pathLst>
-            </a:custGeom>
-            <a:solidFill>
-              <a:srgbClr val="242725">
-                <a:alpha val="4705"/>
-              </a:srgbClr>
-            </a:solidFill>
-          </p:spPr>
-        </p:sp>
-      </p:grpSp>
     </p:spTree>
   </p:cSld>
   <p:clrMapOvr>
@@ -12925,31 +13090,6 @@
         </p:blipFill>
         <p:spPr>
           <a:xfrm flipH="false" flipV="false" rot="0">
-            <a:off x="8403394" y="4354158"/>
-            <a:ext cx="7128814" cy="5340130"/>
-          </a:xfrm>
-          <a:prstGeom prst="rect">
-            <a:avLst/>
-          </a:prstGeom>
-        </p:spPr>
-      </p:pic>
-      <p:pic>
-        <p:nvPicPr>
-          <p:cNvPr name="Picture 14" id="14"/>
-          <p:cNvPicPr>
-            <a:picLocks noChangeAspect="true"/>
-          </p:cNvPicPr>
-          <p:nvPr/>
-        </p:nvPicPr>
-        <p:blipFill>
-          <a:blip r:embed="rId3"/>
-          <a:srcRect l="0" t="0" r="0" b="0"/>
-          <a:stretch>
-            <a:fillRect/>
-          </a:stretch>
-        </p:blipFill>
-        <p:spPr>
-          <a:xfrm flipH="false" flipV="false" rot="0">
             <a:off x="1028700" y="3264811"/>
             <a:ext cx="5993489" cy="5993489"/>
           </a:xfrm>
@@ -12960,7 +13100,7 @@
       </p:pic>
       <p:sp>
         <p:nvSpPr>
-          <p:cNvPr name="TextBox 15" id="15"/>
+          <p:cNvPr name="TextBox 14" id="14"/>
           <p:cNvSpPr txBox="true"/>
           <p:nvPr/>
         </p:nvSpPr>
@@ -12998,7 +13138,7 @@
       </p:sp>
       <p:sp>
         <p:nvSpPr>
-          <p:cNvPr name="TextBox 16" id="16"/>
+          <p:cNvPr name="TextBox 15" id="15"/>
           <p:cNvSpPr txBox="true"/>
           <p:nvPr/>
         </p:nvSpPr>
@@ -13905,7 +14045,7 @@
                 <a:solidFill>
                   <a:srgbClr val="242725"/>
                 </a:solidFill>
-                <a:latin typeface="Quicksand Light Bold"/>
+                <a:latin typeface="Quicksand Light"/>
               </a:rPr>
               <a:t> Nosso Desafio</a:t>
             </a:r>
@@ -13923,7 +14063,7 @@
                 <a:solidFill>
                   <a:srgbClr val="242725"/>
                 </a:solidFill>
-                <a:latin typeface="Quicksand Light Bold"/>
+                <a:latin typeface="Quicksand Light"/>
               </a:rPr>
               <a:t> Design &amp; Implementação</a:t>
             </a:r>
@@ -13941,7 +14081,7 @@
                 <a:solidFill>
                   <a:srgbClr val="242725"/>
                 </a:solidFill>
-                <a:latin typeface="Quicksand Light Bold"/>
+                <a:latin typeface="Quicksand Light"/>
               </a:rPr>
               <a:t> Nosso Desenvolvimento</a:t>
             </a:r>
@@ -13959,7 +14099,7 @@
                 <a:solidFill>
                   <a:srgbClr val="242725"/>
                 </a:solidFill>
-                <a:latin typeface="Quicksand Light Bold"/>
+                <a:latin typeface="Quicksand Light"/>
               </a:rPr>
               <a:t> Dicas de amor</a:t>
             </a:r>
@@ -14141,7 +14281,7 @@
                 <a:solidFill>
                   <a:srgbClr val="242725"/>
                 </a:solidFill>
-                <a:latin typeface="Quicksand Light Bold"/>
+                <a:latin typeface="Quicksand Light"/>
               </a:rPr>
               <a:t>Software Escalável</a:t>
             </a:r>
@@ -14182,7 +14322,7 @@
                 <a:solidFill>
                   <a:srgbClr val="242725"/>
                 </a:solidFill>
-                <a:latin typeface="Quicksand Light Bold"/>
+                <a:latin typeface="Quicksand Light"/>
               </a:rPr>
               <a:t>Manutenibilidade</a:t>
             </a:r>
@@ -14223,7 +14363,7 @@
                 <a:solidFill>
                   <a:srgbClr val="242725"/>
                 </a:solidFill>
-                <a:latin typeface="Quicksand Light Bold"/>
+                <a:latin typeface="Quicksand Light"/>
               </a:rPr>
               <a:t>Qualidade</a:t>
             </a:r>
@@ -15758,7 +15898,7 @@
                 <a:solidFill>
                   <a:srgbClr val="242725"/>
                 </a:solidFill>
-                <a:latin typeface="Quicksand Light Bold"/>
+                <a:latin typeface="Quicksand Light"/>
               </a:rPr>
               <a:t>padrão. que padrão?</a:t>
             </a:r>
@@ -15818,7 +15958,7 @@
                 <a:solidFill>
                   <a:srgbClr val="242725"/>
                 </a:solidFill>
-                <a:latin typeface="Quicksand Light Bold"/>
+                <a:latin typeface="Quicksand Light"/>
               </a:rPr>
               <a:t>ctrl + c, ctrl + v</a:t>
             </a:r>
@@ -15859,7 +15999,7 @@
                 <a:solidFill>
                   <a:srgbClr val="242725"/>
                 </a:solidFill>
-                <a:latin typeface="Quicksand Light Bold"/>
+                <a:latin typeface="Quicksand Light"/>
               </a:rPr>
               <a:t>mudanças = dor de cabeça</a:t>
             </a:r>
@@ -20027,44 +20167,217 @@
           <a:chExt cx="0" cy="0"/>
         </a:xfrm>
       </p:grpSpPr>
-      <p:sp>
-        <p:nvSpPr>
-          <p:cNvPr name="TextBox 2" id="2"/>
-          <p:cNvSpPr txBox="true"/>
+      <p:grpSp>
+        <p:nvGrpSpPr>
+          <p:cNvPr name="Group 2" id="2"/>
+          <p:cNvGrpSpPr/>
           <p:nvPr/>
-        </p:nvSpPr>
-        <p:spPr>
+        </p:nvGrpSpPr>
+        <p:grpSpPr>
           <a:xfrm rot="0">
-            <a:off x="3090788" y="4295775"/>
-            <a:ext cx="12106424" cy="1533525"/>
+            <a:off x="9315853" y="7337631"/>
+            <a:ext cx="6216356" cy="6216356"/>
+            <a:chOff x="0" y="0"/>
+            <a:chExt cx="6350000" cy="6350000"/>
           </a:xfrm>
-          <a:prstGeom prst="rect">
-            <a:avLst/>
-          </a:prstGeom>
-        </p:spPr>
-        <p:txBody>
-          <a:bodyPr anchor="t" rtlCol="false" tIns="0" lIns="0" bIns="0" rIns="0">
-            <a:spAutoFit/>
-          </a:bodyPr>
-          <a:lstStyle/>
-          <a:p>
-            <a:pPr algn="ctr">
-              <a:lnSpc>
-                <a:spcPts val="12599"/>
-              </a:lnSpc>
-            </a:pPr>
-            <a:r>
-              <a:rPr lang="en-US" sz="9000">
-                <a:solidFill>
-                  <a:srgbClr val="000000"/>
-                </a:solidFill>
-                <a:latin typeface="Open Sans Extra Bold"/>
-              </a:rPr>
-              <a:t>incluir git flatbutton</a:t>
-            </a:r>
-          </a:p>
-        </p:txBody>
-      </p:sp>
+        </p:grpSpPr>
+        <p:sp>
+          <p:nvSpPr>
+            <p:cNvPr name="Freeform 3" id="3"/>
+            <p:cNvSpPr/>
+            <p:nvPr/>
+          </p:nvSpPr>
+          <p:spPr>
+            <a:xfrm>
+              <a:off x="14167" y="0"/>
+              <a:ext cx="6321665" cy="6350000"/>
+            </a:xfrm>
+            <a:custGeom>
+              <a:avLst/>
+              <a:gdLst/>
+              <a:ahLst/>
+              <a:cxnLst/>
+              <a:rect r="r" b="b" t="t" l="l"/>
+              <a:pathLst>
+                <a:path h="6350000" w="6321665">
+                  <a:moveTo>
+                    <a:pt x="3160833" y="0"/>
+                  </a:moveTo>
+                  <a:lnTo>
+                    <a:pt x="3160833" y="0"/>
+                  </a:lnTo>
+                  <a:cubicBezTo>
+                    <a:pt x="4908795" y="7817"/>
+                    <a:pt x="6321666" y="1427021"/>
+                    <a:pt x="6321666" y="3175000"/>
+                  </a:cubicBezTo>
+                  <a:cubicBezTo>
+                    <a:pt x="6321666" y="4922979"/>
+                    <a:pt x="4908795" y="6342183"/>
+                    <a:pt x="3160833" y="6350000"/>
+                  </a:cubicBezTo>
+                  <a:cubicBezTo>
+                    <a:pt x="1412871" y="6342183"/>
+                    <a:pt x="0" y="4922979"/>
+                    <a:pt x="0" y="3175000"/>
+                  </a:cubicBezTo>
+                  <a:cubicBezTo>
+                    <a:pt x="0" y="1427021"/>
+                    <a:pt x="1412871" y="7817"/>
+                    <a:pt x="3160833" y="0"/>
+                  </a:cubicBezTo>
+                  <a:close/>
+                </a:path>
+              </a:pathLst>
+            </a:custGeom>
+            <a:solidFill>
+              <a:srgbClr val="242725">
+                <a:alpha val="4705"/>
+              </a:srgbClr>
+            </a:solidFill>
+          </p:spPr>
+        </p:sp>
+      </p:grpSp>
+      <p:grpSp>
+        <p:nvGrpSpPr>
+          <p:cNvPr name="Group 4" id="4"/>
+          <p:cNvGrpSpPr/>
+          <p:nvPr/>
+        </p:nvGrpSpPr>
+        <p:grpSpPr>
+          <a:xfrm rot="0">
+            <a:off x="15720609" y="8200652"/>
+            <a:ext cx="1538691" cy="1538691"/>
+            <a:chOff x="0" y="0"/>
+            <a:chExt cx="6350000" cy="6350000"/>
+          </a:xfrm>
+        </p:grpSpPr>
+        <p:sp>
+          <p:nvSpPr>
+            <p:cNvPr name="Freeform 5" id="5"/>
+            <p:cNvSpPr/>
+            <p:nvPr/>
+          </p:nvSpPr>
+          <p:spPr>
+            <a:xfrm>
+              <a:off x="14167" y="0"/>
+              <a:ext cx="6321665" cy="6350000"/>
+            </a:xfrm>
+            <a:custGeom>
+              <a:avLst/>
+              <a:gdLst/>
+              <a:ahLst/>
+              <a:cxnLst/>
+              <a:rect r="r" b="b" t="t" l="l"/>
+              <a:pathLst>
+                <a:path h="6350000" w="6321665">
+                  <a:moveTo>
+                    <a:pt x="3160833" y="0"/>
+                  </a:moveTo>
+                  <a:lnTo>
+                    <a:pt x="3160833" y="0"/>
+                  </a:lnTo>
+                  <a:cubicBezTo>
+                    <a:pt x="4908795" y="7817"/>
+                    <a:pt x="6321666" y="1427021"/>
+                    <a:pt x="6321666" y="3175000"/>
+                  </a:cubicBezTo>
+                  <a:cubicBezTo>
+                    <a:pt x="6321666" y="4922979"/>
+                    <a:pt x="4908795" y="6342183"/>
+                    <a:pt x="3160833" y="6350000"/>
+                  </a:cubicBezTo>
+                  <a:cubicBezTo>
+                    <a:pt x="1412871" y="6342183"/>
+                    <a:pt x="0" y="4922979"/>
+                    <a:pt x="0" y="3175000"/>
+                  </a:cubicBezTo>
+                  <a:cubicBezTo>
+                    <a:pt x="0" y="1427021"/>
+                    <a:pt x="1412871" y="7817"/>
+                    <a:pt x="3160833" y="0"/>
+                  </a:cubicBezTo>
+                  <a:close/>
+                </a:path>
+              </a:pathLst>
+            </a:custGeom>
+            <a:solidFill>
+              <a:srgbClr val="2ED47B"/>
+            </a:solidFill>
+          </p:spPr>
+        </p:sp>
+      </p:grpSp>
+      <p:grpSp>
+        <p:nvGrpSpPr>
+          <p:cNvPr name="Group 6" id="6"/>
+          <p:cNvGrpSpPr/>
+          <p:nvPr/>
+        </p:nvGrpSpPr>
+        <p:grpSpPr>
+          <a:xfrm rot="0">
+            <a:off x="16780498" y="8491196"/>
+            <a:ext cx="957604" cy="957604"/>
+            <a:chOff x="0" y="0"/>
+            <a:chExt cx="6350000" cy="6350000"/>
+          </a:xfrm>
+        </p:grpSpPr>
+        <p:sp>
+          <p:nvSpPr>
+            <p:cNvPr name="Freeform 7" id="7"/>
+            <p:cNvSpPr/>
+            <p:nvPr/>
+          </p:nvSpPr>
+          <p:spPr>
+            <a:xfrm>
+              <a:off x="14167" y="0"/>
+              <a:ext cx="6321665" cy="6350000"/>
+            </a:xfrm>
+            <a:custGeom>
+              <a:avLst/>
+              <a:gdLst/>
+              <a:ahLst/>
+              <a:cxnLst/>
+              <a:rect r="r" b="b" t="t" l="l"/>
+              <a:pathLst>
+                <a:path h="6350000" w="6321665">
+                  <a:moveTo>
+                    <a:pt x="3160833" y="0"/>
+                  </a:moveTo>
+                  <a:lnTo>
+                    <a:pt x="3160833" y="0"/>
+                  </a:lnTo>
+                  <a:cubicBezTo>
+                    <a:pt x="4908795" y="7817"/>
+                    <a:pt x="6321666" y="1427021"/>
+                    <a:pt x="6321666" y="3175000"/>
+                  </a:cubicBezTo>
+                  <a:cubicBezTo>
+                    <a:pt x="6321666" y="4922979"/>
+                    <a:pt x="4908795" y="6342183"/>
+                    <a:pt x="3160833" y="6350000"/>
+                  </a:cubicBezTo>
+                  <a:cubicBezTo>
+                    <a:pt x="1412871" y="6342183"/>
+                    <a:pt x="0" y="4922979"/>
+                    <a:pt x="0" y="3175000"/>
+                  </a:cubicBezTo>
+                  <a:cubicBezTo>
+                    <a:pt x="0" y="1427021"/>
+                    <a:pt x="1412871" y="7817"/>
+                    <a:pt x="3160833" y="0"/>
+                  </a:cubicBezTo>
+                  <a:close/>
+                </a:path>
+              </a:pathLst>
+            </a:custGeom>
+            <a:solidFill>
+              <a:srgbClr val="242725">
+                <a:alpha val="4705"/>
+              </a:srgbClr>
+            </a:solidFill>
+          </p:spPr>
+        </p:sp>
+      </p:grpSp>
     </p:spTree>
   </p:cSld>
   <p:clrMapOvr>

</xml_diff>